<commit_message>
more on probabilistic models.
</commit_message>
<xml_diff>
--- a/slides/13_bayes_nets.pptx
+++ b/slides/13_bayes_nets.pptx
@@ -9,7 +9,7 @@
   </p:notesMasterIdLst>
   <p:sldIdLst>
     <p:sldId id="294" r:id="rId2"/>
-    <p:sldId id="410" r:id="rId3"/>
+    <p:sldId id="415" r:id="rId3"/>
     <p:sldId id="414" r:id="rId4"/>
     <p:sldId id="412" r:id="rId5"/>
     <p:sldId id="259" r:id="rId6"/>
@@ -9064,7 +9064,7 @@
             <a:fld id="{71CA99E0-E95C-4F1B-B0F2-4565A2B40149}" type="datetimeFigureOut">
               <a:rPr lang="en-US" smtClean="0"/>
               <a:pPr/>
-              <a:t>5/19/2024</a:t>
+              <a:t>6/11/2024</a:t>
             </a:fld>
             <a:endParaRPr lang="en-US"/>
           </a:p>
@@ -9370,6 +9370,91 @@
         </p:nvSpPr>
         <p:spPr/>
         <p:txBody>
+          <a:bodyPr/>
+          <a:lstStyle/>
+          <a:p>
+            <a:endParaRPr lang="en-US" dirty="0"/>
+          </a:p>
+        </p:txBody>
+      </p:sp>
+      <p:sp>
+        <p:nvSpPr>
+          <p:cNvPr id="4" name="Slide Number Placeholder 3"/>
+          <p:cNvSpPr>
+            <a:spLocks noGrp="1"/>
+          </p:cNvSpPr>
+          <p:nvPr>
+            <p:ph type="sldNum" sz="quarter" idx="5"/>
+          </p:nvPr>
+        </p:nvSpPr>
+        <p:spPr/>
+        <p:txBody>
+          <a:bodyPr/>
+          <a:lstStyle/>
+          <a:p>
+            <a:fld id="{8C6DDC4A-28AC-4BB0-A17C-4732441B2B82}" type="slidenum">
+              <a:rPr lang="en-US" smtClean="0"/>
+              <a:pPr/>
+              <a:t>2</a:t>
+            </a:fld>
+            <a:endParaRPr lang="en-US"/>
+          </a:p>
+        </p:txBody>
+      </p:sp>
+    </p:spTree>
+    <p:extLst>
+      <p:ext uri="{BB962C8B-B14F-4D97-AF65-F5344CB8AC3E}">
+        <p14:creationId xmlns:p14="http://schemas.microsoft.com/office/powerpoint/2010/main" val="4060627335"/>
+      </p:ext>
+    </p:extLst>
+  </p:cSld>
+  <p:clrMapOvr>
+    <a:masterClrMapping/>
+  </p:clrMapOvr>
+</p:notes>
+</file>
+
+<file path=ppt/notesSlides/notesSlide10.xml><?xml version="1.0" encoding="utf-8"?>
+<p:notes xmlns:a="http://schemas.openxmlformats.org/drawingml/2006/main" xmlns:r="http://schemas.openxmlformats.org/officeDocument/2006/relationships" xmlns:p="http://schemas.openxmlformats.org/presentationml/2006/main">
+  <p:cSld>
+    <p:spTree>
+      <p:nvGrpSpPr>
+        <p:cNvPr id="1" name=""/>
+        <p:cNvGrpSpPr/>
+        <p:nvPr/>
+      </p:nvGrpSpPr>
+      <p:grpSpPr>
+        <a:xfrm>
+          <a:off x="0" y="0"/>
+          <a:ext cx="0" cy="0"/>
+          <a:chOff x="0" y="0"/>
+          <a:chExt cx="0" cy="0"/>
+        </a:xfrm>
+      </p:grpSpPr>
+      <p:sp>
+        <p:nvSpPr>
+          <p:cNvPr id="2" name="Slide Image Placeholder 1"/>
+          <p:cNvSpPr>
+            <a:spLocks noGrp="1" noRot="1" noChangeAspect="1"/>
+          </p:cNvSpPr>
+          <p:nvPr>
+            <p:ph type="sldImg"/>
+          </p:nvPr>
+        </p:nvSpPr>
+        <p:spPr/>
+      </p:sp>
+      <p:sp>
+        <p:nvSpPr>
+          <p:cNvPr id="3" name="Notes Placeholder 2"/>
+          <p:cNvSpPr>
+            <a:spLocks noGrp="1"/>
+          </p:cNvSpPr>
+          <p:nvPr>
+            <p:ph type="body" idx="1"/>
+          </p:nvPr>
+        </p:nvSpPr>
+        <p:spPr/>
+        <p:txBody>
           <a:bodyPr>
             <a:normAutofit/>
           </a:bodyPr>
@@ -9397,7 +9482,7 @@
             <a:fld id="{C6A2EA70-8A4C-40BF-A25E-4BD4BBF0DDA4}" type="slidenum">
               <a:rPr lang="en-US" smtClean="0"/>
               <a:pPr/>
-              <a:t>5</a:t>
+              <a:t>13</a:t>
             </a:fld>
             <a:endParaRPr lang="en-US"/>
           </a:p>
@@ -9411,7 +9496,7 @@
 </p:notes>
 </file>
 
-<file path=ppt/notesSlides/notesSlide10.xml><?xml version="1.0" encoding="utf-8"?>
+<file path=ppt/notesSlides/notesSlide11.xml><?xml version="1.0" encoding="utf-8"?>
 <p:notes xmlns:a="http://schemas.openxmlformats.org/drawingml/2006/main" xmlns:r="http://schemas.openxmlformats.org/officeDocument/2006/relationships" xmlns:p="http://schemas.openxmlformats.org/presentationml/2006/main">
   <p:cSld>
     <p:spTree>
@@ -9493,7 +9578,7 @@
 </p:notes>
 </file>
 
-<file path=ppt/notesSlides/notesSlide11.xml><?xml version="1.0" encoding="utf-8"?>
+<file path=ppt/notesSlides/notesSlide12.xml><?xml version="1.0" encoding="utf-8"?>
 <p:notes xmlns:a="http://schemas.openxmlformats.org/drawingml/2006/main" xmlns:r="http://schemas.openxmlformats.org/officeDocument/2006/relationships" xmlns:p="http://schemas.openxmlformats.org/presentationml/2006/main">
   <p:cSld>
     <p:spTree>
@@ -9580,7 +9665,7 @@
 </p:notes>
 </file>
 
-<file path=ppt/notesSlides/notesSlide12.xml><?xml version="1.0" encoding="utf-8"?>
+<file path=ppt/notesSlides/notesSlide13.xml><?xml version="1.0" encoding="utf-8"?>
 <p:notes xmlns:a="http://schemas.openxmlformats.org/drawingml/2006/main" xmlns:r="http://schemas.openxmlformats.org/officeDocument/2006/relationships" xmlns:p="http://schemas.openxmlformats.org/presentationml/2006/main">
   <p:cSld>
     <p:spTree>
@@ -9662,7 +9747,7 @@
 </p:notes>
 </file>
 
-<file path=ppt/notesSlides/notesSlide13.xml><?xml version="1.0" encoding="utf-8"?>
+<file path=ppt/notesSlides/notesSlide14.xml><?xml version="1.0" encoding="utf-8"?>
 <p:notes xmlns:a="http://schemas.openxmlformats.org/drawingml/2006/main" xmlns:r="http://schemas.openxmlformats.org/officeDocument/2006/relationships" xmlns:p="http://schemas.openxmlformats.org/presentationml/2006/main">
   <p:cSld>
     <p:spTree>
@@ -9744,7 +9829,7 @@
 </p:notes>
 </file>
 
-<file path=ppt/notesSlides/notesSlide14.xml><?xml version="1.0" encoding="utf-8"?>
+<file path=ppt/notesSlides/notesSlide15.xml><?xml version="1.0" encoding="utf-8"?>
 <p:notes xmlns:a="http://schemas.openxmlformats.org/drawingml/2006/main" xmlns:r="http://schemas.openxmlformats.org/officeDocument/2006/relationships" xmlns:p="http://schemas.openxmlformats.org/presentationml/2006/main">
   <p:cSld>
     <p:spTree>
@@ -9826,7 +9911,7 @@
 </p:notes>
 </file>
 
-<file path=ppt/notesSlides/notesSlide15.xml><?xml version="1.0" encoding="utf-8"?>
+<file path=ppt/notesSlides/notesSlide16.xml><?xml version="1.0" encoding="utf-8"?>
 <p:notes xmlns:a="http://schemas.openxmlformats.org/drawingml/2006/main" xmlns:r="http://schemas.openxmlformats.org/officeDocument/2006/relationships" xmlns:p="http://schemas.openxmlformats.org/presentationml/2006/main">
   <p:cSld>
     <p:spTree>
@@ -9908,7 +9993,7 @@
 </p:notes>
 </file>
 
-<file path=ppt/notesSlides/notesSlide16.xml><?xml version="1.0" encoding="utf-8"?>
+<file path=ppt/notesSlides/notesSlide17.xml><?xml version="1.0" encoding="utf-8"?>
 <p:notes xmlns:a="http://schemas.openxmlformats.org/drawingml/2006/main" xmlns:r="http://schemas.openxmlformats.org/officeDocument/2006/relationships" xmlns:p="http://schemas.openxmlformats.org/presentationml/2006/main">
   <p:cSld>
     <p:spTree>
@@ -9990,7 +10075,7 @@
 </p:notes>
 </file>
 
-<file path=ppt/notesSlides/notesSlide17.xml><?xml version="1.0" encoding="utf-8"?>
+<file path=ppt/notesSlides/notesSlide18.xml><?xml version="1.0" encoding="utf-8"?>
 <p:notes xmlns:a="http://schemas.openxmlformats.org/drawingml/2006/main" xmlns:r="http://schemas.openxmlformats.org/officeDocument/2006/relationships" xmlns:p="http://schemas.openxmlformats.org/presentationml/2006/main">
   <p:cSld>
     <p:spTree>
@@ -10072,7 +10157,7 @@
 </p:notes>
 </file>
 
-<file path=ppt/notesSlides/notesSlide18.xml><?xml version="1.0" encoding="utf-8"?>
+<file path=ppt/notesSlides/notesSlide19.xml><?xml version="1.0" encoding="utf-8"?>
 <p:notes xmlns:a="http://schemas.openxmlformats.org/drawingml/2006/main" xmlns:r="http://schemas.openxmlformats.org/officeDocument/2006/relationships" xmlns:p="http://schemas.openxmlformats.org/presentationml/2006/main">
   <p:cSld>
     <p:spTree>
@@ -10154,7 +10239,89 @@
 </p:notes>
 </file>
 
-<file path=ppt/notesSlides/notesSlide19.xml><?xml version="1.0" encoding="utf-8"?>
+<file path=ppt/notesSlides/notesSlide2.xml><?xml version="1.0" encoding="utf-8"?>
+<p:notes xmlns:a="http://schemas.openxmlformats.org/drawingml/2006/main" xmlns:r="http://schemas.openxmlformats.org/officeDocument/2006/relationships" xmlns:p="http://schemas.openxmlformats.org/presentationml/2006/main">
+  <p:cSld>
+    <p:spTree>
+      <p:nvGrpSpPr>
+        <p:cNvPr id="1" name=""/>
+        <p:cNvGrpSpPr/>
+        <p:nvPr/>
+      </p:nvGrpSpPr>
+      <p:grpSpPr>
+        <a:xfrm>
+          <a:off x="0" y="0"/>
+          <a:ext cx="0" cy="0"/>
+          <a:chOff x="0" y="0"/>
+          <a:chExt cx="0" cy="0"/>
+        </a:xfrm>
+      </p:grpSpPr>
+      <p:sp>
+        <p:nvSpPr>
+          <p:cNvPr id="2" name="Slide Image Placeholder 1"/>
+          <p:cNvSpPr>
+            <a:spLocks noGrp="1" noRot="1" noChangeAspect="1"/>
+          </p:cNvSpPr>
+          <p:nvPr>
+            <p:ph type="sldImg"/>
+          </p:nvPr>
+        </p:nvSpPr>
+        <p:spPr/>
+      </p:sp>
+      <p:sp>
+        <p:nvSpPr>
+          <p:cNvPr id="3" name="Notes Placeholder 2"/>
+          <p:cNvSpPr>
+            <a:spLocks noGrp="1"/>
+          </p:cNvSpPr>
+          <p:nvPr>
+            <p:ph type="body" idx="1"/>
+          </p:nvPr>
+        </p:nvSpPr>
+        <p:spPr/>
+        <p:txBody>
+          <a:bodyPr>
+            <a:normAutofit/>
+          </a:bodyPr>
+          <a:lstStyle/>
+          <a:p>
+            <a:endParaRPr lang="en-US"/>
+          </a:p>
+        </p:txBody>
+      </p:sp>
+      <p:sp>
+        <p:nvSpPr>
+          <p:cNvPr id="4" name="Slide Number Placeholder 3"/>
+          <p:cNvSpPr>
+            <a:spLocks noGrp="1"/>
+          </p:cNvSpPr>
+          <p:nvPr>
+            <p:ph type="sldNum" sz="quarter" idx="10"/>
+          </p:nvPr>
+        </p:nvSpPr>
+        <p:spPr/>
+        <p:txBody>
+          <a:bodyPr/>
+          <a:lstStyle/>
+          <a:p>
+            <a:fld id="{C6A2EA70-8A4C-40BF-A25E-4BD4BBF0DDA4}" type="slidenum">
+              <a:rPr lang="en-US" smtClean="0"/>
+              <a:pPr/>
+              <a:t>5</a:t>
+            </a:fld>
+            <a:endParaRPr lang="en-US"/>
+          </a:p>
+        </p:txBody>
+      </p:sp>
+    </p:spTree>
+  </p:cSld>
+  <p:clrMapOvr>
+    <a:masterClrMapping/>
+  </p:clrMapOvr>
+</p:notes>
+</file>
+
+<file path=ppt/notesSlides/notesSlide20.xml><?xml version="1.0" encoding="utf-8"?>
 <p:notes xmlns:a="http://schemas.openxmlformats.org/drawingml/2006/main" xmlns:r="http://schemas.openxmlformats.org/officeDocument/2006/relationships" xmlns:p="http://schemas.openxmlformats.org/presentationml/2006/main">
   <p:cSld>
     <p:spTree>
@@ -10236,89 +10403,7 @@
 </p:notes>
 </file>
 
-<file path=ppt/notesSlides/notesSlide2.xml><?xml version="1.0" encoding="utf-8"?>
-<p:notes xmlns:a="http://schemas.openxmlformats.org/drawingml/2006/main" xmlns:r="http://schemas.openxmlformats.org/officeDocument/2006/relationships" xmlns:p="http://schemas.openxmlformats.org/presentationml/2006/main">
-  <p:cSld>
-    <p:spTree>
-      <p:nvGrpSpPr>
-        <p:cNvPr id="1" name=""/>
-        <p:cNvGrpSpPr/>
-        <p:nvPr/>
-      </p:nvGrpSpPr>
-      <p:grpSpPr>
-        <a:xfrm>
-          <a:off x="0" y="0"/>
-          <a:ext cx="0" cy="0"/>
-          <a:chOff x="0" y="0"/>
-          <a:chExt cx="0" cy="0"/>
-        </a:xfrm>
-      </p:grpSpPr>
-      <p:sp>
-        <p:nvSpPr>
-          <p:cNvPr id="2" name="Slide Image Placeholder 1"/>
-          <p:cNvSpPr>
-            <a:spLocks noGrp="1" noRot="1" noChangeAspect="1"/>
-          </p:cNvSpPr>
-          <p:nvPr>
-            <p:ph type="sldImg"/>
-          </p:nvPr>
-        </p:nvSpPr>
-        <p:spPr/>
-      </p:sp>
-      <p:sp>
-        <p:nvSpPr>
-          <p:cNvPr id="3" name="Notes Placeholder 2"/>
-          <p:cNvSpPr>
-            <a:spLocks noGrp="1"/>
-          </p:cNvSpPr>
-          <p:nvPr>
-            <p:ph type="body" idx="1"/>
-          </p:nvPr>
-        </p:nvSpPr>
-        <p:spPr/>
-        <p:txBody>
-          <a:bodyPr>
-            <a:normAutofit/>
-          </a:bodyPr>
-          <a:lstStyle/>
-          <a:p>
-            <a:endParaRPr lang="en-US"/>
-          </a:p>
-        </p:txBody>
-      </p:sp>
-      <p:sp>
-        <p:nvSpPr>
-          <p:cNvPr id="4" name="Slide Number Placeholder 3"/>
-          <p:cNvSpPr>
-            <a:spLocks noGrp="1"/>
-          </p:cNvSpPr>
-          <p:nvPr>
-            <p:ph type="sldNum" sz="quarter" idx="10"/>
-          </p:nvPr>
-        </p:nvSpPr>
-        <p:spPr/>
-        <p:txBody>
-          <a:bodyPr/>
-          <a:lstStyle/>
-          <a:p>
-            <a:fld id="{C6A2EA70-8A4C-40BF-A25E-4BD4BBF0DDA4}" type="slidenum">
-              <a:rPr lang="en-US" smtClean="0"/>
-              <a:pPr/>
-              <a:t>6</a:t>
-            </a:fld>
-            <a:endParaRPr lang="en-US"/>
-          </a:p>
-        </p:txBody>
-      </p:sp>
-    </p:spTree>
-  </p:cSld>
-  <p:clrMapOvr>
-    <a:masterClrMapping/>
-  </p:clrMapOvr>
-</p:notes>
-</file>
-
-<file path=ppt/notesSlides/notesSlide20.xml><?xml version="1.0" encoding="utf-8"?>
+<file path=ppt/notesSlides/notesSlide21.xml><?xml version="1.0" encoding="utf-8"?>
 <p:notes xmlns:a="http://schemas.openxmlformats.org/drawingml/2006/main" xmlns:r="http://schemas.openxmlformats.org/officeDocument/2006/relationships" xmlns:p="http://schemas.openxmlformats.org/presentationml/2006/main">
   <p:cSld>
     <p:spTree>
@@ -10400,7 +10485,7 @@
 </p:notes>
 </file>
 
-<file path=ppt/notesSlides/notesSlide21.xml><?xml version="1.0" encoding="utf-8"?>
+<file path=ppt/notesSlides/notesSlide22.xml><?xml version="1.0" encoding="utf-8"?>
 <p:notes xmlns:a="http://schemas.openxmlformats.org/drawingml/2006/main" xmlns:r="http://schemas.openxmlformats.org/officeDocument/2006/relationships" xmlns:p="http://schemas.openxmlformats.org/presentationml/2006/main">
   <p:cSld>
     <p:spTree>
@@ -10487,7 +10572,7 @@
 </p:notes>
 </file>
 
-<file path=ppt/notesSlides/notesSlide22.xml><?xml version="1.0" encoding="utf-8"?>
+<file path=ppt/notesSlides/notesSlide23.xml><?xml version="1.0" encoding="utf-8"?>
 <p:notes xmlns:a="http://schemas.openxmlformats.org/drawingml/2006/main" xmlns:r="http://schemas.openxmlformats.org/officeDocument/2006/relationships" xmlns:p="http://schemas.openxmlformats.org/presentationml/2006/main">
   <p:cSld>
     <p:spTree>
@@ -10569,7 +10654,7 @@
 </p:notes>
 </file>
 
-<file path=ppt/notesSlides/notesSlide23.xml><?xml version="1.0" encoding="utf-8"?>
+<file path=ppt/notesSlides/notesSlide24.xml><?xml version="1.0" encoding="utf-8"?>
 <p:notes xmlns:a="http://schemas.openxmlformats.org/drawingml/2006/main" xmlns:r="http://schemas.openxmlformats.org/officeDocument/2006/relationships" xmlns:p="http://schemas.openxmlformats.org/presentationml/2006/main">
   <p:cSld>
     <p:spTree>
@@ -10651,7 +10736,7 @@
 </p:notes>
 </file>
 
-<file path=ppt/notesSlides/notesSlide24.xml><?xml version="1.0" encoding="utf-8"?>
+<file path=ppt/notesSlides/notesSlide25.xml><?xml version="1.0" encoding="utf-8"?>
 <p:notes xmlns:a="http://schemas.openxmlformats.org/drawingml/2006/main" xmlns:r="http://schemas.openxmlformats.org/officeDocument/2006/relationships" xmlns:p="http://schemas.openxmlformats.org/presentationml/2006/main">
   <p:cSld>
     <p:spTree>
@@ -10733,7 +10818,7 @@
 </p:notes>
 </file>
 
-<file path=ppt/notesSlides/notesSlide25.xml><?xml version="1.0" encoding="utf-8"?>
+<file path=ppt/notesSlides/notesSlide26.xml><?xml version="1.0" encoding="utf-8"?>
 <p:notes xmlns:a="http://schemas.openxmlformats.org/drawingml/2006/main" xmlns:r="http://schemas.openxmlformats.org/officeDocument/2006/relationships" xmlns:p="http://schemas.openxmlformats.org/presentationml/2006/main">
   <p:cSld>
     <p:spTree>
@@ -10815,7 +10900,7 @@
 </p:notes>
 </file>
 
-<file path=ppt/notesSlides/notesSlide26.xml><?xml version="1.0" encoding="utf-8"?>
+<file path=ppt/notesSlides/notesSlide27.xml><?xml version="1.0" encoding="utf-8"?>
 <p:notes xmlns:a="http://schemas.openxmlformats.org/drawingml/2006/main" xmlns:r="http://schemas.openxmlformats.org/officeDocument/2006/relationships" xmlns:p="http://schemas.openxmlformats.org/presentationml/2006/main">
   <p:cSld>
     <p:spTree>
@@ -10897,7 +10982,7 @@
 </p:notes>
 </file>
 
-<file path=ppt/notesSlides/notesSlide27.xml><?xml version="1.0" encoding="utf-8"?>
+<file path=ppt/notesSlides/notesSlide28.xml><?xml version="1.0" encoding="utf-8"?>
 <p:notes xmlns:a="http://schemas.openxmlformats.org/drawingml/2006/main" xmlns:r="http://schemas.openxmlformats.org/officeDocument/2006/relationships" xmlns:p="http://schemas.openxmlformats.org/presentationml/2006/main">
   <p:cSld>
     <p:spTree>
@@ -10979,7 +11064,7 @@
 </p:notes>
 </file>
 
-<file path=ppt/notesSlides/notesSlide28.xml><?xml version="1.0" encoding="utf-8"?>
+<file path=ppt/notesSlides/notesSlide29.xml><?xml version="1.0" encoding="utf-8"?>
 <p:notes xmlns:a="http://schemas.openxmlformats.org/drawingml/2006/main" xmlns:r="http://schemas.openxmlformats.org/officeDocument/2006/relationships" xmlns:p="http://schemas.openxmlformats.org/presentationml/2006/main">
   <p:cSld>
     <p:spTree>
@@ -11061,7 +11146,89 @@
 </p:notes>
 </file>
 
-<file path=ppt/notesSlides/notesSlide29.xml><?xml version="1.0" encoding="utf-8"?>
+<file path=ppt/notesSlides/notesSlide3.xml><?xml version="1.0" encoding="utf-8"?>
+<p:notes xmlns:a="http://schemas.openxmlformats.org/drawingml/2006/main" xmlns:r="http://schemas.openxmlformats.org/officeDocument/2006/relationships" xmlns:p="http://schemas.openxmlformats.org/presentationml/2006/main">
+  <p:cSld>
+    <p:spTree>
+      <p:nvGrpSpPr>
+        <p:cNvPr id="1" name=""/>
+        <p:cNvGrpSpPr/>
+        <p:nvPr/>
+      </p:nvGrpSpPr>
+      <p:grpSpPr>
+        <a:xfrm>
+          <a:off x="0" y="0"/>
+          <a:ext cx="0" cy="0"/>
+          <a:chOff x="0" y="0"/>
+          <a:chExt cx="0" cy="0"/>
+        </a:xfrm>
+      </p:grpSpPr>
+      <p:sp>
+        <p:nvSpPr>
+          <p:cNvPr id="2" name="Slide Image Placeholder 1"/>
+          <p:cNvSpPr>
+            <a:spLocks noGrp="1" noRot="1" noChangeAspect="1"/>
+          </p:cNvSpPr>
+          <p:nvPr>
+            <p:ph type="sldImg"/>
+          </p:nvPr>
+        </p:nvSpPr>
+        <p:spPr/>
+      </p:sp>
+      <p:sp>
+        <p:nvSpPr>
+          <p:cNvPr id="3" name="Notes Placeholder 2"/>
+          <p:cNvSpPr>
+            <a:spLocks noGrp="1"/>
+          </p:cNvSpPr>
+          <p:nvPr>
+            <p:ph type="body" idx="1"/>
+          </p:nvPr>
+        </p:nvSpPr>
+        <p:spPr/>
+        <p:txBody>
+          <a:bodyPr>
+            <a:normAutofit/>
+          </a:bodyPr>
+          <a:lstStyle/>
+          <a:p>
+            <a:endParaRPr lang="en-US"/>
+          </a:p>
+        </p:txBody>
+      </p:sp>
+      <p:sp>
+        <p:nvSpPr>
+          <p:cNvPr id="4" name="Slide Number Placeholder 3"/>
+          <p:cNvSpPr>
+            <a:spLocks noGrp="1"/>
+          </p:cNvSpPr>
+          <p:nvPr>
+            <p:ph type="sldNum" sz="quarter" idx="10"/>
+          </p:nvPr>
+        </p:nvSpPr>
+        <p:spPr/>
+        <p:txBody>
+          <a:bodyPr/>
+          <a:lstStyle/>
+          <a:p>
+            <a:fld id="{C6A2EA70-8A4C-40BF-A25E-4BD4BBF0DDA4}" type="slidenum">
+              <a:rPr lang="en-US" smtClean="0"/>
+              <a:pPr/>
+              <a:t>6</a:t>
+            </a:fld>
+            <a:endParaRPr lang="en-US"/>
+          </a:p>
+        </p:txBody>
+      </p:sp>
+    </p:spTree>
+  </p:cSld>
+  <p:clrMapOvr>
+    <a:masterClrMapping/>
+  </p:clrMapOvr>
+</p:notes>
+</file>
+
+<file path=ppt/notesSlides/notesSlide30.xml><?xml version="1.0" encoding="utf-8"?>
 <p:notes xmlns:a="http://schemas.openxmlformats.org/drawingml/2006/main" xmlns:r="http://schemas.openxmlformats.org/officeDocument/2006/relationships" xmlns:p="http://schemas.openxmlformats.org/presentationml/2006/main">
   <p:cSld>
     <p:spTree>
@@ -11148,89 +11315,7 @@
 </p:notes>
 </file>
 
-<file path=ppt/notesSlides/notesSlide3.xml><?xml version="1.0" encoding="utf-8"?>
-<p:notes xmlns:a="http://schemas.openxmlformats.org/drawingml/2006/main" xmlns:r="http://schemas.openxmlformats.org/officeDocument/2006/relationships" xmlns:p="http://schemas.openxmlformats.org/presentationml/2006/main">
-  <p:cSld>
-    <p:spTree>
-      <p:nvGrpSpPr>
-        <p:cNvPr id="1" name=""/>
-        <p:cNvGrpSpPr/>
-        <p:nvPr/>
-      </p:nvGrpSpPr>
-      <p:grpSpPr>
-        <a:xfrm>
-          <a:off x="0" y="0"/>
-          <a:ext cx="0" cy="0"/>
-          <a:chOff x="0" y="0"/>
-          <a:chExt cx="0" cy="0"/>
-        </a:xfrm>
-      </p:grpSpPr>
-      <p:sp>
-        <p:nvSpPr>
-          <p:cNvPr id="2" name="Slide Image Placeholder 1"/>
-          <p:cNvSpPr>
-            <a:spLocks noGrp="1" noRot="1" noChangeAspect="1"/>
-          </p:cNvSpPr>
-          <p:nvPr>
-            <p:ph type="sldImg"/>
-          </p:nvPr>
-        </p:nvSpPr>
-        <p:spPr/>
-      </p:sp>
-      <p:sp>
-        <p:nvSpPr>
-          <p:cNvPr id="3" name="Notes Placeholder 2"/>
-          <p:cNvSpPr>
-            <a:spLocks noGrp="1"/>
-          </p:cNvSpPr>
-          <p:nvPr>
-            <p:ph type="body" idx="1"/>
-          </p:nvPr>
-        </p:nvSpPr>
-        <p:spPr/>
-        <p:txBody>
-          <a:bodyPr>
-            <a:normAutofit/>
-          </a:bodyPr>
-          <a:lstStyle/>
-          <a:p>
-            <a:endParaRPr lang="en-US"/>
-          </a:p>
-        </p:txBody>
-      </p:sp>
-      <p:sp>
-        <p:nvSpPr>
-          <p:cNvPr id="4" name="Slide Number Placeholder 3"/>
-          <p:cNvSpPr>
-            <a:spLocks noGrp="1"/>
-          </p:cNvSpPr>
-          <p:nvPr>
-            <p:ph type="sldNum" sz="quarter" idx="10"/>
-          </p:nvPr>
-        </p:nvSpPr>
-        <p:spPr/>
-        <p:txBody>
-          <a:bodyPr/>
-          <a:lstStyle/>
-          <a:p>
-            <a:fld id="{C6A2EA70-8A4C-40BF-A25E-4BD4BBF0DDA4}" type="slidenum">
-              <a:rPr lang="en-US" smtClean="0"/>
-              <a:pPr/>
-              <a:t>7</a:t>
-            </a:fld>
-            <a:endParaRPr lang="en-US"/>
-          </a:p>
-        </p:txBody>
-      </p:sp>
-    </p:spTree>
-  </p:cSld>
-  <p:clrMapOvr>
-    <a:masterClrMapping/>
-  </p:clrMapOvr>
-</p:notes>
-</file>
-
-<file path=ppt/notesSlides/notesSlide30.xml><?xml version="1.0" encoding="utf-8"?>
+<file path=ppt/notesSlides/notesSlide31.xml><?xml version="1.0" encoding="utf-8"?>
 <p:notes xmlns:a="http://schemas.openxmlformats.org/drawingml/2006/main" xmlns:r="http://schemas.openxmlformats.org/officeDocument/2006/relationships" xmlns:p="http://schemas.openxmlformats.org/presentationml/2006/main">
   <p:cSld>
     <p:spTree>
@@ -11317,7 +11402,7 @@
 </p:notes>
 </file>
 
-<file path=ppt/notesSlides/notesSlide31.xml><?xml version="1.0" encoding="utf-8"?>
+<file path=ppt/notesSlides/notesSlide32.xml><?xml version="1.0" encoding="utf-8"?>
 <p:notes xmlns:a="http://schemas.openxmlformats.org/drawingml/2006/main" xmlns:r="http://schemas.openxmlformats.org/officeDocument/2006/relationships" xmlns:p="http://schemas.openxmlformats.org/presentationml/2006/main">
   <p:cSld>
     <p:spTree>
@@ -11472,7 +11557,7 @@
             <a:fld id="{C6A2EA70-8A4C-40BF-A25E-4BD4BBF0DDA4}" type="slidenum">
               <a:rPr lang="en-US" smtClean="0"/>
               <a:pPr/>
-              <a:t>8</a:t>
+              <a:t>7</a:t>
             </a:fld>
             <a:endParaRPr lang="en-US"/>
           </a:p>
@@ -11554,7 +11639,7 @@
             <a:fld id="{C6A2EA70-8A4C-40BF-A25E-4BD4BBF0DDA4}" type="slidenum">
               <a:rPr lang="en-US" smtClean="0"/>
               <a:pPr/>
-              <a:t>9</a:t>
+              <a:t>8</a:t>
             </a:fld>
             <a:endParaRPr lang="en-US"/>
           </a:p>
@@ -11636,7 +11721,7 @@
             <a:fld id="{C6A2EA70-8A4C-40BF-A25E-4BD4BBF0DDA4}" type="slidenum">
               <a:rPr lang="en-US" smtClean="0"/>
               <a:pPr/>
-              <a:t>10</a:t>
+              <a:t>9</a:t>
             </a:fld>
             <a:endParaRPr lang="en-US"/>
           </a:p>
@@ -11718,7 +11803,7 @@
             <a:fld id="{C6A2EA70-8A4C-40BF-A25E-4BD4BBF0DDA4}" type="slidenum">
               <a:rPr lang="en-US" smtClean="0"/>
               <a:pPr/>
-              <a:t>11</a:t>
+              <a:t>10</a:t>
             </a:fld>
             <a:endParaRPr lang="en-US"/>
           </a:p>
@@ -11800,7 +11885,7 @@
             <a:fld id="{C6A2EA70-8A4C-40BF-A25E-4BD4BBF0DDA4}" type="slidenum">
               <a:rPr lang="en-US" smtClean="0"/>
               <a:pPr/>
-              <a:t>12</a:t>
+              <a:t>11</a:t>
             </a:fld>
             <a:endParaRPr lang="en-US"/>
           </a:p>
@@ -11882,7 +11967,7 @@
             <a:fld id="{C6A2EA70-8A4C-40BF-A25E-4BD4BBF0DDA4}" type="slidenum">
               <a:rPr lang="en-US" smtClean="0"/>
               <a:pPr/>
-              <a:t>13</a:t>
+              <a:t>12</a:t>
             </a:fld>
             <a:endParaRPr lang="en-US"/>
           </a:p>
@@ -16196,8 +16281,8 @@
           </a:p>
         </p:txBody>
       </p:sp>
-      <mc:AlternateContent xmlns:mc="http://schemas.openxmlformats.org/markup-compatibility/2006">
-        <mc:Choice xmlns:a14="http://schemas.microsoft.com/office/drawing/2010/main" Requires="a14">
+      <mc:AlternateContent xmlns:mc="http://schemas.openxmlformats.org/markup-compatibility/2006" xmlns:a14="http://schemas.microsoft.com/office/drawing/2010/main">
+        <mc:Choice Requires="a14">
           <p:sp>
             <p:nvSpPr>
               <p:cNvPr id="5123" name="Rectangle 3"/>
@@ -16333,7 +16418,7 @@
             </p:txBody>
           </p:sp>
         </mc:Choice>
-        <mc:Fallback>
+        <mc:Fallback xmlns="">
           <p:sp>
             <p:nvSpPr>
               <p:cNvPr id="5123" name="Rectangle 3"/>
@@ -16769,8 +16854,8 @@
             </a:p>
           </p:txBody>
         </p:sp>
-        <mc:AlternateContent xmlns:mc="http://schemas.openxmlformats.org/markup-compatibility/2006">
-          <mc:Choice xmlns:a14="http://schemas.microsoft.com/office/drawing/2010/main" Requires="a14">
+        <mc:AlternateContent xmlns:mc="http://schemas.openxmlformats.org/markup-compatibility/2006" xmlns:a14="http://schemas.microsoft.com/office/drawing/2010/main">
+          <mc:Choice Requires="a14">
             <p:sp>
               <p:nvSpPr>
                 <p:cNvPr id="23" name="Rectangle 22"/>
@@ -16913,7 +16998,7 @@
               </p:txBody>
             </p:sp>
           </mc:Choice>
-          <mc:Fallback>
+          <mc:Fallback xmlns="">
             <p:sp>
               <p:nvSpPr>
                 <p:cNvPr id="23" name="Rectangle 22"/>
@@ -17366,8 +17451,8 @@
           </a:p>
         </p:txBody>
       </p:sp>
-      <mc:AlternateContent xmlns:mc="http://schemas.openxmlformats.org/markup-compatibility/2006">
-        <mc:Choice xmlns:a14="http://schemas.microsoft.com/office/drawing/2010/main" Requires="a14">
+      <mc:AlternateContent xmlns:mc="http://schemas.openxmlformats.org/markup-compatibility/2006" xmlns:a14="http://schemas.microsoft.com/office/drawing/2010/main">
+        <mc:Choice Requires="a14">
           <p:sp>
             <p:nvSpPr>
               <p:cNvPr id="10243" name="Rectangle 3"/>
@@ -17807,7 +17892,7 @@
             </p:txBody>
           </p:sp>
         </mc:Choice>
-        <mc:Fallback>
+        <mc:Fallback xmlns="">
           <p:sp>
             <p:nvSpPr>
               <p:cNvPr id="10243" name="Rectangle 3"/>
@@ -18075,8 +18160,8 @@
           </a:p>
         </p:txBody>
       </p:sp>
-      <mc:AlternateContent xmlns:mc="http://schemas.openxmlformats.org/markup-compatibility/2006">
-        <mc:Choice xmlns:a14="http://schemas.microsoft.com/office/drawing/2010/main" Requires="a14">
+      <mc:AlternateContent xmlns:mc="http://schemas.openxmlformats.org/markup-compatibility/2006" xmlns:a14="http://schemas.microsoft.com/office/drawing/2010/main">
+        <mc:Choice Requires="a14">
           <p:sp>
             <p:nvSpPr>
               <p:cNvPr id="5123" name="Rectangle 3"/>
@@ -18580,7 +18665,7 @@
             </p:txBody>
           </p:sp>
         </mc:Choice>
-        <mc:Fallback>
+        <mc:Fallback xmlns="">
           <p:sp>
             <p:nvSpPr>
               <p:cNvPr id="5123" name="Rectangle 3"/>
@@ -20418,8 +20503,8 @@
           </a:p>
         </p:txBody>
       </p:sp>
-      <mc:AlternateContent xmlns:mc="http://schemas.openxmlformats.org/markup-compatibility/2006">
-        <mc:Choice xmlns:a14="http://schemas.microsoft.com/office/drawing/2010/main" Requires="a14">
+      <mc:AlternateContent xmlns:mc="http://schemas.openxmlformats.org/markup-compatibility/2006" xmlns:a14="http://schemas.microsoft.com/office/drawing/2010/main">
+        <mc:Choice Requires="a14">
           <p:sp>
             <p:nvSpPr>
               <p:cNvPr id="9219" name="Rectangle 3"/>
@@ -20738,7 +20823,7 @@
             </p:txBody>
           </p:sp>
         </mc:Choice>
-        <mc:Fallback>
+        <mc:Fallback xmlns="">
           <p:sp>
             <p:nvSpPr>
               <p:cNvPr id="9219" name="Rectangle 3"/>
@@ -20845,8 +20930,8 @@
           </a:p>
         </p:txBody>
       </p:sp>
-      <mc:AlternateContent xmlns:mc="http://schemas.openxmlformats.org/markup-compatibility/2006">
-        <mc:Choice xmlns:a14="http://schemas.microsoft.com/office/drawing/2010/main" Requires="a14">
+      <mc:AlternateContent xmlns:mc="http://schemas.openxmlformats.org/markup-compatibility/2006" xmlns:a14="http://schemas.microsoft.com/office/drawing/2010/main">
+        <mc:Choice Requires="a14">
           <p:sp>
             <p:nvSpPr>
               <p:cNvPr id="11267" name="Rectangle 3"/>
@@ -21225,7 +21310,7 @@
             </p:txBody>
           </p:sp>
         </mc:Choice>
-        <mc:Fallback>
+        <mc:Fallback xmlns="">
           <p:sp>
             <p:nvSpPr>
               <p:cNvPr id="11267" name="Rectangle 3"/>
@@ -21641,13 +21726,13 @@
               <a:rPr lang="en-US" dirty="0">
                 <a:ea typeface="ＭＳ Ｐゴシック" pitchFamily="34" charset="-128"/>
               </a:rPr>
-              <a:t>Probability Recap</a:t>
+              <a:t>Probability Theory Recap</a:t>
             </a:r>
           </a:p>
         </p:txBody>
       </p:sp>
-      <mc:AlternateContent xmlns:mc="http://schemas.openxmlformats.org/markup-compatibility/2006">
-        <mc:Choice xmlns:a14="http://schemas.microsoft.com/office/drawing/2010/main" Requires="a14">
+      <mc:AlternateContent xmlns:mc="http://schemas.openxmlformats.org/markup-compatibility/2006" xmlns:a14="http://schemas.microsoft.com/office/drawing/2010/main">
+        <mc:Choice Requires="a14">
           <p:sp>
             <p:nvSpPr>
               <p:cNvPr id="30722" name="Content Placeholder 2"/>
@@ -21660,8 +21745,8 @@
             </p:nvSpPr>
             <p:spPr>
               <a:xfrm>
-                <a:off x="628650" y="1644649"/>
-                <a:ext cx="7886700" cy="4351338"/>
+                <a:off x="628650" y="1447800"/>
+                <a:ext cx="7886700" cy="4548187"/>
               </a:xfrm>
             </p:spPr>
             <p:txBody>
@@ -21676,49 +21761,21 @@
                   <a:defRPr/>
                 </a:pPr>
                 <a:r>
-                  <a:rPr lang="en-US" sz="2000" b="1" dirty="0"/>
+                  <a:rPr lang="en-US" sz="1800" dirty="0"/>
                   <a:t>Notation</a:t>
                 </a:r>
                 <a:r>
-                  <a:rPr lang="en-US" sz="2000" b="0" dirty="0"/>
-                  <a:t>: </a:t>
+                  <a:rPr lang="en-US" sz="1800" b="0" dirty="0"/>
+                  <a:t>: 	</a:t>
+                </a:r>
+                <a:r>
+                  <a:rPr lang="en-US" sz="1800" dirty="0"/>
+                  <a:t>Prob. of an event </a:t>
                 </a:r>
                 <a14:m>
                   <m:oMath xmlns:m="http://schemas.openxmlformats.org/officeDocument/2006/math">
                     <m:r>
-                      <a:rPr lang="en-US" sz="2000" i="1" dirty="0" smtClean="0">
-                        <a:latin typeface="Cambria Math" panose="02040503050406030204" pitchFamily="18" charset="0"/>
-                      </a:rPr>
-                      <m:t>𝑃</m:t>
-                    </m:r>
-                    <m:r>
-                      <a:rPr lang="en-US" sz="2000" i="1" dirty="0" smtClean="0">
-                        <a:latin typeface="Cambria Math" panose="02040503050406030204" pitchFamily="18" charset="0"/>
-                      </a:rPr>
-                      <m:t>(</m:t>
-                    </m:r>
-                    <m:r>
-                      <a:rPr lang="en-US" sz="2000" i="1" dirty="0" smtClean="0">
-                        <a:latin typeface="Cambria Math" panose="02040503050406030204" pitchFamily="18" charset="0"/>
-                      </a:rPr>
-                      <m:t>𝑋</m:t>
-                    </m:r>
-                    <m:r>
-                      <a:rPr lang="en-US" sz="2000" i="1" dirty="0" smtClean="0">
-                        <a:latin typeface="Cambria Math" panose="02040503050406030204" pitchFamily="18" charset="0"/>
-                      </a:rPr>
-                      <m:t>)</m:t>
-                    </m:r>
-                  </m:oMath>
-                </a14:m>
-                <a:r>
-                  <a:rPr lang="en-US" sz="2000" dirty="0"/>
-                  <a:t> vs.  </a:t>
-                </a:r>
-                <a14:m>
-                  <m:oMath xmlns:m="http://schemas.openxmlformats.org/officeDocument/2006/math">
-                    <m:r>
-                      <a:rPr lang="en-US" sz="2000" b="0" i="1" smtClean="0">
+                      <a:rPr lang="en-US" sz="1800" b="0" i="1" smtClean="0">
                         <a:latin typeface="Cambria Math" panose="02040503050406030204" pitchFamily="18" charset="0"/>
                       </a:rPr>
                       <m:t>𝑃</m:t>
@@ -21726,26 +21783,26 @@
                     <m:d>
                       <m:dPr>
                         <m:ctrlPr>
-                          <a:rPr lang="en-US" sz="2000" b="0" i="1" smtClean="0">
+                          <a:rPr lang="en-US" sz="1800" b="0" i="1" smtClean="0">
                             <a:latin typeface="Cambria Math" panose="02040503050406030204" pitchFamily="18" charset="0"/>
                           </a:rPr>
                         </m:ctrlPr>
                       </m:dPr>
                       <m:e>
                         <m:r>
-                          <a:rPr lang="en-US" sz="2000" b="0" i="1" smtClean="0">
+                          <a:rPr lang="en-US" sz="1800" b="0" i="1" smtClean="0">
                             <a:latin typeface="Cambria Math" panose="02040503050406030204" pitchFamily="18" charset="0"/>
                           </a:rPr>
                           <m:t>𝑋</m:t>
                         </m:r>
                         <m:r>
-                          <a:rPr lang="en-US" sz="2000" b="0" i="1" smtClean="0">
+                          <a:rPr lang="en-US" sz="1800" b="0" i="1" smtClean="0">
                             <a:latin typeface="Cambria Math" panose="02040503050406030204" pitchFamily="18" charset="0"/>
                           </a:rPr>
                           <m:t>=</m:t>
                         </m:r>
                         <m:r>
-                          <a:rPr lang="en-US" sz="2000" b="0" i="1" smtClean="0">
+                          <a:rPr lang="en-US" sz="1800" b="0" i="1" smtClean="0">
                             <a:latin typeface="Cambria Math" panose="02040503050406030204" pitchFamily="18" charset="0"/>
                           </a:rPr>
                           <m:t>𝑥</m:t>
@@ -21753,38 +21810,273 @@
                       </m:e>
                     </m:d>
                     <m:r>
-                      <a:rPr lang="en-US" sz="2000" b="0" i="1" smtClean="0">
+                      <a:rPr lang="en-US" sz="1800" b="0" i="1" smtClean="0">
                         <a:latin typeface="Cambria Math" panose="02040503050406030204" pitchFamily="18" charset="0"/>
                       </a:rPr>
                       <m:t>=</m:t>
                     </m:r>
                     <m:r>
-                      <a:rPr lang="en-US" sz="2000" b="0" i="1" smtClean="0">
+                      <a:rPr lang="en-US" sz="1800" b="0" i="1" smtClean="0">
                         <a:latin typeface="Cambria Math" panose="02040503050406030204" pitchFamily="18" charset="0"/>
                       </a:rPr>
                       <m:t>𝑃</m:t>
                     </m:r>
                     <m:r>
-                      <a:rPr lang="en-US" sz="2000" b="0" i="1" smtClean="0">
+                      <a:rPr lang="en-US" sz="1800" b="0" i="1" smtClean="0">
                         <a:latin typeface="Cambria Math" panose="02040503050406030204" pitchFamily="18" charset="0"/>
                       </a:rPr>
                       <m:t>(</m:t>
                     </m:r>
                     <m:r>
-                      <a:rPr lang="en-US" sz="2000" b="0" i="1" smtClean="0">
+                      <a:rPr lang="en-US" sz="1800" b="0" i="1" smtClean="0">
                         <a:latin typeface="Cambria Math" panose="02040503050406030204" pitchFamily="18" charset="0"/>
                       </a:rPr>
                       <m:t>𝑥</m:t>
                     </m:r>
                     <m:r>
-                      <a:rPr lang="en-US" sz="2000" b="0" i="1" smtClean="0">
+                      <a:rPr lang="en-US" sz="1800" b="0" i="1" smtClean="0">
                         <a:latin typeface="Cambria Math" panose="02040503050406030204" pitchFamily="18" charset="0"/>
                       </a:rPr>
                       <m:t>)</m:t>
                     </m:r>
                   </m:oMath>
                 </a14:m>
-                <a:endParaRPr lang="en-US" sz="2000" dirty="0"/>
+                <a:br>
+                  <a:rPr lang="en-US" sz="1800" dirty="0"/>
+                </a:br>
+                <a:r>
+                  <a:rPr lang="en-US" sz="1800" dirty="0"/>
+                  <a:t>                  	Prob. distribution </a:t>
+                </a:r>
+                <a14:m>
+                  <m:oMath xmlns:m="http://schemas.openxmlformats.org/officeDocument/2006/math">
+                    <m:r>
+                      <a:rPr lang="en-US" sz="1800" b="1" i="1" smtClean="0">
+                        <a:latin typeface="Cambria Math" panose="02040503050406030204" pitchFamily="18" charset="0"/>
+                      </a:rPr>
+                      <m:t>𝑷</m:t>
+                    </m:r>
+                    <m:d>
+                      <m:dPr>
+                        <m:ctrlPr>
+                          <a:rPr lang="en-US" sz="1800" b="0" i="1" smtClean="0">
+                            <a:latin typeface="Cambria Math" panose="02040503050406030204" pitchFamily="18" charset="0"/>
+                          </a:rPr>
+                        </m:ctrlPr>
+                      </m:dPr>
+                      <m:e>
+                        <m:r>
+                          <a:rPr lang="en-US" sz="1800" b="0" i="1" smtClean="0">
+                            <a:latin typeface="Cambria Math" panose="02040503050406030204" pitchFamily="18" charset="0"/>
+                          </a:rPr>
+                          <m:t>𝑋</m:t>
+                        </m:r>
+                      </m:e>
+                    </m:d>
+                    <m:r>
+                      <a:rPr lang="en-US" sz="1800" b="0" i="0" smtClean="0">
+                        <a:latin typeface="Cambria Math" panose="02040503050406030204" pitchFamily="18" charset="0"/>
+                      </a:rPr>
+                      <m:t>=</m:t>
+                    </m:r>
+                    <m:d>
+                      <m:dPr>
+                        <m:begChr m:val="⟨"/>
+                        <m:endChr m:val="⟩"/>
+                        <m:ctrlPr>
+                          <a:rPr lang="en-US" sz="1800" b="0" i="1" smtClean="0">
+                            <a:latin typeface="Cambria Math" panose="02040503050406030204" pitchFamily="18" charset="0"/>
+                          </a:rPr>
+                        </m:ctrlPr>
+                      </m:dPr>
+                      <m:e>
+                        <m:r>
+                          <a:rPr lang="en-US" sz="1800" b="0" i="1" smtClean="0">
+                            <a:latin typeface="Cambria Math" panose="02040503050406030204" pitchFamily="18" charset="0"/>
+                          </a:rPr>
+                          <m:t>𝑃</m:t>
+                        </m:r>
+                        <m:d>
+                          <m:dPr>
+                            <m:ctrlPr>
+                              <a:rPr lang="en-US" sz="1800" b="0" i="1" smtClean="0">
+                                <a:latin typeface="Cambria Math" panose="02040503050406030204" pitchFamily="18" charset="0"/>
+                              </a:rPr>
+                            </m:ctrlPr>
+                          </m:dPr>
+                          <m:e>
+                            <m:r>
+                              <a:rPr lang="en-US" sz="1800" b="0" i="1" smtClean="0">
+                                <a:latin typeface="Cambria Math" panose="02040503050406030204" pitchFamily="18" charset="0"/>
+                              </a:rPr>
+                              <m:t>𝑋</m:t>
+                            </m:r>
+                            <m:r>
+                              <a:rPr lang="en-US" sz="1800" b="0" i="1" smtClean="0">
+                                <a:latin typeface="Cambria Math" panose="02040503050406030204" pitchFamily="18" charset="0"/>
+                              </a:rPr>
+                              <m:t>=</m:t>
+                            </m:r>
+                            <m:sSub>
+                              <m:sSubPr>
+                                <m:ctrlPr>
+                                  <a:rPr lang="en-US" sz="1800" b="0" i="1" smtClean="0">
+                                    <a:latin typeface="Cambria Math" panose="02040503050406030204" pitchFamily="18" charset="0"/>
+                                  </a:rPr>
+                                </m:ctrlPr>
+                              </m:sSubPr>
+                              <m:e>
+                                <m:r>
+                                  <a:rPr lang="en-US" sz="1800" b="0" i="1" smtClean="0">
+                                    <a:latin typeface="Cambria Math" panose="02040503050406030204" pitchFamily="18" charset="0"/>
+                                  </a:rPr>
+                                  <m:t>𝑥</m:t>
+                                </m:r>
+                              </m:e>
+                              <m:sub>
+                                <m:r>
+                                  <a:rPr lang="en-US" sz="1800" b="0" i="1" smtClean="0">
+                                    <a:latin typeface="Cambria Math" panose="02040503050406030204" pitchFamily="18" charset="0"/>
+                                  </a:rPr>
+                                  <m:t>1</m:t>
+                                </m:r>
+                              </m:sub>
+                            </m:sSub>
+                          </m:e>
+                        </m:d>
+                        <m:r>
+                          <a:rPr lang="en-US" sz="1800" b="0" i="1" smtClean="0">
+                            <a:latin typeface="Cambria Math" panose="02040503050406030204" pitchFamily="18" charset="0"/>
+                          </a:rPr>
+                          <m:t>, </m:t>
+                        </m:r>
+                        <m:r>
+                          <a:rPr lang="en-US" sz="1800" b="0" i="1" smtClean="0">
+                            <a:latin typeface="Cambria Math" panose="02040503050406030204" pitchFamily="18" charset="0"/>
+                          </a:rPr>
+                          <m:t>𝑃</m:t>
+                        </m:r>
+                        <m:d>
+                          <m:dPr>
+                            <m:ctrlPr>
+                              <a:rPr lang="en-US" sz="1800" b="0" i="1" smtClean="0">
+                                <a:latin typeface="Cambria Math" panose="02040503050406030204" pitchFamily="18" charset="0"/>
+                              </a:rPr>
+                            </m:ctrlPr>
+                          </m:dPr>
+                          <m:e>
+                            <m:r>
+                              <a:rPr lang="en-US" sz="1800" b="0" i="1" smtClean="0">
+                                <a:latin typeface="Cambria Math" panose="02040503050406030204" pitchFamily="18" charset="0"/>
+                              </a:rPr>
+                              <m:t>𝑋</m:t>
+                            </m:r>
+                            <m:r>
+                              <a:rPr lang="en-US" sz="1800" b="0" i="1" smtClean="0">
+                                <a:latin typeface="Cambria Math" panose="02040503050406030204" pitchFamily="18" charset="0"/>
+                              </a:rPr>
+                              <m:t>=</m:t>
+                            </m:r>
+                            <m:sSub>
+                              <m:sSubPr>
+                                <m:ctrlPr>
+                                  <a:rPr lang="en-US" sz="1800" b="0" i="1" smtClean="0">
+                                    <a:latin typeface="Cambria Math" panose="02040503050406030204" pitchFamily="18" charset="0"/>
+                                  </a:rPr>
+                                </m:ctrlPr>
+                              </m:sSubPr>
+                              <m:e>
+                                <m:r>
+                                  <a:rPr lang="en-US" sz="1800" b="0" i="1" smtClean="0">
+                                    <a:latin typeface="Cambria Math" panose="02040503050406030204" pitchFamily="18" charset="0"/>
+                                  </a:rPr>
+                                  <m:t>𝑥</m:t>
+                                </m:r>
+                              </m:e>
+                              <m:sub>
+                                <m:r>
+                                  <a:rPr lang="en-US" sz="1800" b="0" i="1" smtClean="0">
+                                    <a:latin typeface="Cambria Math" panose="02040503050406030204" pitchFamily="18" charset="0"/>
+                                  </a:rPr>
+                                  <m:t>2</m:t>
+                                </m:r>
+                              </m:sub>
+                            </m:sSub>
+                          </m:e>
+                        </m:d>
+                        <m:r>
+                          <a:rPr lang="en-US" sz="1800" b="0" i="1" smtClean="0">
+                            <a:latin typeface="Cambria Math" panose="02040503050406030204" pitchFamily="18" charset="0"/>
+                          </a:rPr>
+                          <m:t>, …, </m:t>
+                        </m:r>
+                        <m:r>
+                          <a:rPr lang="en-US" sz="1800" b="0" i="1" smtClean="0">
+                            <a:latin typeface="Cambria Math" panose="02040503050406030204" pitchFamily="18" charset="0"/>
+                          </a:rPr>
+                          <m:t>𝑃</m:t>
+                        </m:r>
+                        <m:d>
+                          <m:dPr>
+                            <m:ctrlPr>
+                              <a:rPr lang="en-US" sz="1800" b="0" i="1" smtClean="0">
+                                <a:latin typeface="Cambria Math" panose="02040503050406030204" pitchFamily="18" charset="0"/>
+                              </a:rPr>
+                            </m:ctrlPr>
+                          </m:dPr>
+                          <m:e>
+                            <m:r>
+                              <a:rPr lang="en-US" sz="1800" b="0" i="1" smtClean="0">
+                                <a:latin typeface="Cambria Math" panose="02040503050406030204" pitchFamily="18" charset="0"/>
+                              </a:rPr>
+                              <m:t>𝑋</m:t>
+                            </m:r>
+                            <m:r>
+                              <a:rPr lang="en-US" sz="1800" b="0" i="1" smtClean="0">
+                                <a:latin typeface="Cambria Math" panose="02040503050406030204" pitchFamily="18" charset="0"/>
+                              </a:rPr>
+                              <m:t>=</m:t>
+                            </m:r>
+                            <m:sSub>
+                              <m:sSubPr>
+                                <m:ctrlPr>
+                                  <a:rPr lang="en-US" sz="1800" b="0" i="1" smtClean="0">
+                                    <a:latin typeface="Cambria Math" panose="02040503050406030204" pitchFamily="18" charset="0"/>
+                                  </a:rPr>
+                                </m:ctrlPr>
+                              </m:sSubPr>
+                              <m:e>
+                                <m:r>
+                                  <a:rPr lang="en-US" sz="1800" b="0" i="1" smtClean="0">
+                                    <a:latin typeface="Cambria Math" panose="02040503050406030204" pitchFamily="18" charset="0"/>
+                                  </a:rPr>
+                                  <m:t>𝑥</m:t>
+                                </m:r>
+                              </m:e>
+                              <m:sub>
+                                <m:r>
+                                  <a:rPr lang="en-US" sz="1800" b="0" i="1" smtClean="0">
+                                    <a:latin typeface="Cambria Math" panose="02040503050406030204" pitchFamily="18" charset="0"/>
+                                  </a:rPr>
+                                  <m:t>𝑛</m:t>
+                                </m:r>
+                              </m:sub>
+                            </m:sSub>
+                          </m:e>
+                        </m:d>
+                      </m:e>
+                    </m:d>
+                  </m:oMath>
+                </a14:m>
+                <a:endParaRPr lang="en-US" sz="1800" dirty="0"/>
+              </a:p>
+              <a:p>
+                <a:pPr>
+                  <a:buFont typeface="Wingdings" charset="0"/>
+                  <a:buChar char="§"/>
+                  <a:defRPr/>
+                </a:pPr>
+                <a:endParaRPr lang="en-US" sz="1800" dirty="0"/>
               </a:p>
               <a:p>
                 <a:pPr>
@@ -21793,17 +22085,110 @@
                   <a:defRPr/>
                 </a:pPr>
                 <a:r>
-                  <a:rPr lang="en-US" sz="2000" dirty="0"/>
-                  <a:t>Conditional probability</a:t>
+                  <a:rPr lang="en-US" sz="1800" dirty="0"/>
+                  <a:t>Product rule		 </a:t>
                 </a:r>
-              </a:p>
-              <a:p>
-                <a:pPr lvl="2">
-                  <a:buFont typeface="Wingdings" charset="0"/>
-                  <a:buChar char="§"/>
-                  <a:defRPr/>
-                </a:pPr>
-                <a:endParaRPr lang="en-US" sz="2000" dirty="0"/>
+                <a14:m>
+                  <m:oMath xmlns:m="http://schemas.openxmlformats.org/officeDocument/2006/math">
+                    <m:r>
+                      <a:rPr lang="en-US" sz="1800" b="0" i="1" smtClean="0">
+                        <a:latin typeface="Cambria Math" panose="02040503050406030204" pitchFamily="18" charset="0"/>
+                      </a:rPr>
+                      <m:t>𝑃</m:t>
+                    </m:r>
+                    <m:d>
+                      <m:dPr>
+                        <m:ctrlPr>
+                          <a:rPr lang="en-US" sz="1800" b="0" i="1" smtClean="0">
+                            <a:latin typeface="Cambria Math" panose="02040503050406030204" pitchFamily="18" charset="0"/>
+                          </a:rPr>
+                        </m:ctrlPr>
+                      </m:dPr>
+                      <m:e>
+                        <m:r>
+                          <a:rPr lang="en-US" sz="1800" b="0" i="1" smtClean="0">
+                            <a:latin typeface="Cambria Math" panose="02040503050406030204" pitchFamily="18" charset="0"/>
+                          </a:rPr>
+                          <m:t>𝑥</m:t>
+                        </m:r>
+                        <m:r>
+                          <a:rPr lang="en-US" sz="1800" b="0" i="1" smtClean="0">
+                            <a:latin typeface="Cambria Math" panose="02040503050406030204" pitchFamily="18" charset="0"/>
+                          </a:rPr>
+                          <m:t>,</m:t>
+                        </m:r>
+                        <m:r>
+                          <a:rPr lang="en-US" sz="1800" b="0" i="1" smtClean="0">
+                            <a:latin typeface="Cambria Math" panose="02040503050406030204" pitchFamily="18" charset="0"/>
+                          </a:rPr>
+                          <m:t>𝑦</m:t>
+                        </m:r>
+                      </m:e>
+                    </m:d>
+                    <m:r>
+                      <a:rPr lang="en-US" sz="1800" b="0" i="1" smtClean="0">
+                        <a:latin typeface="Cambria Math" panose="02040503050406030204" pitchFamily="18" charset="0"/>
+                      </a:rPr>
+                      <m:t>=</m:t>
+                    </m:r>
+                    <m:r>
+                      <a:rPr lang="en-US" sz="1800" b="0" i="1" smtClean="0">
+                        <a:latin typeface="Cambria Math" panose="02040503050406030204" pitchFamily="18" charset="0"/>
+                      </a:rPr>
+                      <m:t>𝑃</m:t>
+                    </m:r>
+                    <m:d>
+                      <m:dPr>
+                        <m:ctrlPr>
+                          <a:rPr lang="en-US" sz="1800" b="0" i="1" smtClean="0">
+                            <a:latin typeface="Cambria Math" panose="02040503050406030204" pitchFamily="18" charset="0"/>
+                          </a:rPr>
+                        </m:ctrlPr>
+                      </m:dPr>
+                      <m:e>
+                        <m:r>
+                          <a:rPr lang="en-US" sz="1800" b="0" i="1" smtClean="0">
+                            <a:latin typeface="Cambria Math" panose="02040503050406030204" pitchFamily="18" charset="0"/>
+                          </a:rPr>
+                          <m:t>𝑥</m:t>
+                        </m:r>
+                      </m:e>
+                      <m:e>
+                        <m:r>
+                          <a:rPr lang="en-US" sz="1800" b="0" i="1" smtClean="0">
+                            <a:latin typeface="Cambria Math" panose="02040503050406030204" pitchFamily="18" charset="0"/>
+                          </a:rPr>
+                          <m:t>𝑦</m:t>
+                        </m:r>
+                      </m:e>
+                    </m:d>
+                    <m:r>
+                      <a:rPr lang="en-US" sz="1800" b="0" i="1" smtClean="0">
+                        <a:latin typeface="Cambria Math" panose="02040503050406030204" pitchFamily="18" charset="0"/>
+                      </a:rPr>
+                      <m:t>𝑃</m:t>
+                    </m:r>
+                    <m:r>
+                      <a:rPr lang="en-US" sz="1800" b="0" i="1" smtClean="0">
+                        <a:latin typeface="Cambria Math" panose="02040503050406030204" pitchFamily="18" charset="0"/>
+                      </a:rPr>
+                      <m:t>(</m:t>
+                    </m:r>
+                    <m:r>
+                      <a:rPr lang="en-US" sz="1800" b="0" i="1" smtClean="0">
+                        <a:latin typeface="Cambria Math" panose="02040503050406030204" pitchFamily="18" charset="0"/>
+                      </a:rPr>
+                      <m:t>𝑦</m:t>
+                    </m:r>
+                    <m:r>
+                      <a:rPr lang="en-US" sz="1800" b="0" i="1" smtClean="0">
+                        <a:latin typeface="Cambria Math" panose="02040503050406030204" pitchFamily="18" charset="0"/>
+                      </a:rPr>
+                      <m:t>)</m:t>
+                    </m:r>
+                  </m:oMath>
+                </a14:m>
+                <a:endParaRPr lang="en-US" sz="1800" dirty="0"/>
               </a:p>
               <a:p>
                 <a:pPr>
@@ -21812,17 +22197,540 @@
                   <a:defRPr/>
                 </a:pPr>
                 <a:r>
-                  <a:rPr lang="en-US" sz="2000" dirty="0"/>
-                  <a:t>Product rule</a:t>
+                  <a:rPr lang="en-US" sz="1800" dirty="0"/>
+                  <a:t>Chain rule		</a:t>
                 </a:r>
-              </a:p>
-              <a:p>
-                <a:pPr lvl="2">
-                  <a:buFont typeface="Wingdings" charset="0"/>
-                  <a:buChar char="§"/>
-                  <a:defRPr/>
-                </a:pPr>
-                <a:endParaRPr lang="en-US" sz="2000" dirty="0"/>
+                <a:r>
+                  <a:rPr lang="en-US" sz="1800" b="1" dirty="0"/>
+                  <a:t> </a:t>
+                </a:r>
+                <a14:m>
+                  <m:oMath xmlns:m="http://schemas.openxmlformats.org/officeDocument/2006/math">
+                    <m:r>
+                      <a:rPr lang="en-US" sz="1800" b="1" i="1" smtClean="0">
+                        <a:latin typeface="Cambria Math" panose="02040503050406030204" pitchFamily="18" charset="0"/>
+                      </a:rPr>
+                      <m:t>𝑷</m:t>
+                    </m:r>
+                    <m:d>
+                      <m:dPr>
+                        <m:ctrlPr>
+                          <a:rPr lang="en-US" sz="1800" b="0" i="1" smtClean="0">
+                            <a:latin typeface="Cambria Math" panose="02040503050406030204" pitchFamily="18" charset="0"/>
+                          </a:rPr>
+                        </m:ctrlPr>
+                      </m:dPr>
+                      <m:e>
+                        <m:sSub>
+                          <m:sSubPr>
+                            <m:ctrlPr>
+                              <a:rPr lang="en-US" sz="1800" b="0" i="1" smtClean="0">
+                                <a:latin typeface="Cambria Math" panose="02040503050406030204" pitchFamily="18" charset="0"/>
+                              </a:rPr>
+                            </m:ctrlPr>
+                          </m:sSubPr>
+                          <m:e>
+                            <m:r>
+                              <m:rPr>
+                                <m:sty m:val="p"/>
+                              </m:rPr>
+                              <a:rPr lang="en-US" sz="1800" b="0" i="0" smtClean="0">
+                                <a:latin typeface="Cambria Math" panose="02040503050406030204" pitchFamily="18" charset="0"/>
+                              </a:rPr>
+                              <m:t>X</m:t>
+                            </m:r>
+                          </m:e>
+                          <m:sub>
+                            <m:r>
+                              <a:rPr lang="en-US" sz="1800" b="0" i="0" smtClean="0">
+                                <a:latin typeface="Cambria Math" panose="02040503050406030204" pitchFamily="18" charset="0"/>
+                              </a:rPr>
+                              <m:t>1</m:t>
+                            </m:r>
+                          </m:sub>
+                        </m:sSub>
+                        <m:r>
+                          <a:rPr lang="en-US" sz="1800" b="0" i="0" smtClean="0">
+                            <a:latin typeface="Cambria Math" panose="02040503050406030204" pitchFamily="18" charset="0"/>
+                          </a:rPr>
+                          <m:t>,</m:t>
+                        </m:r>
+                        <m:sSub>
+                          <m:sSubPr>
+                            <m:ctrlPr>
+                              <a:rPr lang="en-US" sz="1800" b="0" i="1" smtClean="0">
+                                <a:latin typeface="Cambria Math" panose="02040503050406030204" pitchFamily="18" charset="0"/>
+                              </a:rPr>
+                            </m:ctrlPr>
+                          </m:sSubPr>
+                          <m:e>
+                            <m:r>
+                              <m:rPr>
+                                <m:sty m:val="p"/>
+                              </m:rPr>
+                              <a:rPr lang="en-US" sz="1800" b="0" i="0" smtClean="0">
+                                <a:latin typeface="Cambria Math" panose="02040503050406030204" pitchFamily="18" charset="0"/>
+                              </a:rPr>
+                              <m:t>X</m:t>
+                            </m:r>
+                          </m:e>
+                          <m:sub>
+                            <m:r>
+                              <a:rPr lang="en-US" sz="1800" b="0" i="0" smtClean="0">
+                                <a:latin typeface="Cambria Math" panose="02040503050406030204" pitchFamily="18" charset="0"/>
+                              </a:rPr>
+                              <m:t>2</m:t>
+                            </m:r>
+                          </m:sub>
+                        </m:sSub>
+                        <m:r>
+                          <a:rPr lang="en-US" sz="1800" b="0" i="0" smtClean="0">
+                            <a:latin typeface="Cambria Math" panose="02040503050406030204" pitchFamily="18" charset="0"/>
+                          </a:rPr>
+                          <m:t>,…,</m:t>
+                        </m:r>
+                        <m:sSub>
+                          <m:sSubPr>
+                            <m:ctrlPr>
+                              <a:rPr lang="en-US" sz="1800" b="0" i="1" smtClean="0">
+                                <a:latin typeface="Cambria Math" panose="02040503050406030204" pitchFamily="18" charset="0"/>
+                              </a:rPr>
+                            </m:ctrlPr>
+                          </m:sSubPr>
+                          <m:e>
+                            <m:r>
+                              <m:rPr>
+                                <m:sty m:val="p"/>
+                              </m:rPr>
+                              <a:rPr lang="en-US" sz="1800" b="0" i="0" smtClean="0">
+                                <a:latin typeface="Cambria Math" panose="02040503050406030204" pitchFamily="18" charset="0"/>
+                              </a:rPr>
+                              <m:t>X</m:t>
+                            </m:r>
+                          </m:e>
+                          <m:sub>
+                            <m:r>
+                              <m:rPr>
+                                <m:sty m:val="p"/>
+                              </m:rPr>
+                              <a:rPr lang="en-US" sz="1800" b="0" i="0" smtClean="0">
+                                <a:latin typeface="Cambria Math" panose="02040503050406030204" pitchFamily="18" charset="0"/>
+                              </a:rPr>
+                              <m:t>n</m:t>
+                            </m:r>
+                          </m:sub>
+                        </m:sSub>
+                      </m:e>
+                    </m:d>
+                    <m:r>
+                      <a:rPr lang="en-US" sz="1800" b="0" i="0" smtClean="0">
+                        <a:latin typeface="Cambria Math" panose="02040503050406030204" pitchFamily="18" charset="0"/>
+                      </a:rPr>
+                      <m:t>=</m:t>
+                    </m:r>
+                    <m:r>
+                      <a:rPr lang="en-US" sz="1800" b="1" i="0" smtClean="0">
+                        <a:latin typeface="Cambria Math" panose="02040503050406030204" pitchFamily="18" charset="0"/>
+                      </a:rPr>
+                      <m:t>𝐏</m:t>
+                    </m:r>
+                    <m:d>
+                      <m:dPr>
+                        <m:ctrlPr>
+                          <a:rPr lang="en-US" sz="1800" b="0" i="1" smtClean="0">
+                            <a:latin typeface="Cambria Math" panose="02040503050406030204" pitchFamily="18" charset="0"/>
+                          </a:rPr>
+                        </m:ctrlPr>
+                      </m:dPr>
+                      <m:e>
+                        <m:sSub>
+                          <m:sSubPr>
+                            <m:ctrlPr>
+                              <a:rPr lang="en-US" sz="1800" b="0" i="1" smtClean="0">
+                                <a:latin typeface="Cambria Math" panose="02040503050406030204" pitchFamily="18" charset="0"/>
+                              </a:rPr>
+                            </m:ctrlPr>
+                          </m:sSubPr>
+                          <m:e>
+                            <m:r>
+                              <m:rPr>
+                                <m:sty m:val="p"/>
+                              </m:rPr>
+                              <a:rPr lang="en-US" sz="1800" b="0" i="0" smtClean="0">
+                                <a:latin typeface="Cambria Math" panose="02040503050406030204" pitchFamily="18" charset="0"/>
+                              </a:rPr>
+                              <m:t>X</m:t>
+                            </m:r>
+                          </m:e>
+                          <m:sub>
+                            <m:r>
+                              <a:rPr lang="en-US" sz="1800" b="0" i="0" smtClean="0">
+                                <a:latin typeface="Cambria Math" panose="02040503050406030204" pitchFamily="18" charset="0"/>
+                              </a:rPr>
+                              <m:t>1</m:t>
+                            </m:r>
+                          </m:sub>
+                        </m:sSub>
+                      </m:e>
+                    </m:d>
+                    <m:r>
+                      <a:rPr lang="en-US" sz="1800" b="1" i="0" smtClean="0">
+                        <a:latin typeface="Cambria Math" panose="02040503050406030204" pitchFamily="18" charset="0"/>
+                      </a:rPr>
+                      <m:t>𝐏</m:t>
+                    </m:r>
+                    <m:d>
+                      <m:dPr>
+                        <m:ctrlPr>
+                          <a:rPr lang="en-US" sz="1800" b="0" i="1" smtClean="0">
+                            <a:latin typeface="Cambria Math" panose="02040503050406030204" pitchFamily="18" charset="0"/>
+                          </a:rPr>
+                        </m:ctrlPr>
+                      </m:dPr>
+                      <m:e>
+                        <m:sSub>
+                          <m:sSubPr>
+                            <m:ctrlPr>
+                              <a:rPr lang="en-US" sz="1800" b="0" i="1" smtClean="0">
+                                <a:latin typeface="Cambria Math" panose="02040503050406030204" pitchFamily="18" charset="0"/>
+                              </a:rPr>
+                            </m:ctrlPr>
+                          </m:sSubPr>
+                          <m:e>
+                            <m:r>
+                              <m:rPr>
+                                <m:sty m:val="p"/>
+                              </m:rPr>
+                              <a:rPr lang="en-US" sz="1800" b="0" i="0" smtClean="0">
+                                <a:latin typeface="Cambria Math" panose="02040503050406030204" pitchFamily="18" charset="0"/>
+                              </a:rPr>
+                              <m:t>X</m:t>
+                            </m:r>
+                          </m:e>
+                          <m:sub>
+                            <m:r>
+                              <a:rPr lang="en-US" sz="1800" b="0" i="0" smtClean="0">
+                                <a:latin typeface="Cambria Math" panose="02040503050406030204" pitchFamily="18" charset="0"/>
+                              </a:rPr>
+                              <m:t>2</m:t>
+                            </m:r>
+                          </m:sub>
+                        </m:sSub>
+                      </m:e>
+                      <m:e>
+                        <m:sSub>
+                          <m:sSubPr>
+                            <m:ctrlPr>
+                              <a:rPr lang="en-US" sz="1800" b="0" i="1" smtClean="0">
+                                <a:latin typeface="Cambria Math" panose="02040503050406030204" pitchFamily="18" charset="0"/>
+                              </a:rPr>
+                            </m:ctrlPr>
+                          </m:sSubPr>
+                          <m:e>
+                            <m:r>
+                              <m:rPr>
+                                <m:sty m:val="p"/>
+                              </m:rPr>
+                              <a:rPr lang="en-US" sz="1800" b="0" i="0" smtClean="0">
+                                <a:latin typeface="Cambria Math" panose="02040503050406030204" pitchFamily="18" charset="0"/>
+                              </a:rPr>
+                              <m:t>X</m:t>
+                            </m:r>
+                          </m:e>
+                          <m:sub>
+                            <m:r>
+                              <a:rPr lang="en-US" sz="1800" b="0" i="0" smtClean="0">
+                                <a:latin typeface="Cambria Math" panose="02040503050406030204" pitchFamily="18" charset="0"/>
+                              </a:rPr>
+                              <m:t>1</m:t>
+                            </m:r>
+                          </m:sub>
+                        </m:sSub>
+                      </m:e>
+                    </m:d>
+                    <m:r>
+                      <a:rPr lang="en-US" sz="1800" b="1" i="0" smtClean="0">
+                        <a:latin typeface="Cambria Math" panose="02040503050406030204" pitchFamily="18" charset="0"/>
+                      </a:rPr>
+                      <m:t>𝐏</m:t>
+                    </m:r>
+                    <m:d>
+                      <m:dPr>
+                        <m:ctrlPr>
+                          <a:rPr lang="en-US" sz="1800" b="0" i="1" smtClean="0">
+                            <a:latin typeface="Cambria Math" panose="02040503050406030204" pitchFamily="18" charset="0"/>
+                          </a:rPr>
+                        </m:ctrlPr>
+                      </m:dPr>
+                      <m:e>
+                        <m:sSub>
+                          <m:sSubPr>
+                            <m:ctrlPr>
+                              <a:rPr lang="en-US" sz="1800" b="0" i="1" smtClean="0">
+                                <a:latin typeface="Cambria Math" panose="02040503050406030204" pitchFamily="18" charset="0"/>
+                              </a:rPr>
+                            </m:ctrlPr>
+                          </m:sSubPr>
+                          <m:e>
+                            <m:r>
+                              <m:rPr>
+                                <m:sty m:val="p"/>
+                              </m:rPr>
+                              <a:rPr lang="en-US" sz="1800" b="0" i="0" smtClean="0">
+                                <a:latin typeface="Cambria Math" panose="02040503050406030204" pitchFamily="18" charset="0"/>
+                              </a:rPr>
+                              <m:t>X</m:t>
+                            </m:r>
+                          </m:e>
+                          <m:sub>
+                            <m:r>
+                              <a:rPr lang="en-US" sz="1800" b="0" i="0" smtClean="0">
+                                <a:latin typeface="Cambria Math" panose="02040503050406030204" pitchFamily="18" charset="0"/>
+                              </a:rPr>
+                              <m:t>3</m:t>
+                            </m:r>
+                          </m:sub>
+                        </m:sSub>
+                      </m:e>
+                      <m:e>
+                        <m:sSub>
+                          <m:sSubPr>
+                            <m:ctrlPr>
+                              <a:rPr lang="en-US" sz="1800" b="0" i="1" smtClean="0">
+                                <a:latin typeface="Cambria Math" panose="02040503050406030204" pitchFamily="18" charset="0"/>
+                              </a:rPr>
+                            </m:ctrlPr>
+                          </m:sSubPr>
+                          <m:e>
+                            <m:r>
+                              <m:rPr>
+                                <m:sty m:val="p"/>
+                              </m:rPr>
+                              <a:rPr lang="en-US" sz="1800" b="0" i="0" smtClean="0">
+                                <a:latin typeface="Cambria Math" panose="02040503050406030204" pitchFamily="18" charset="0"/>
+                              </a:rPr>
+                              <m:t>X</m:t>
+                            </m:r>
+                          </m:e>
+                          <m:sub>
+                            <m:r>
+                              <a:rPr lang="en-US" sz="1800" b="0" i="0" smtClean="0">
+                                <a:latin typeface="Cambria Math" panose="02040503050406030204" pitchFamily="18" charset="0"/>
+                              </a:rPr>
+                              <m:t>1</m:t>
+                            </m:r>
+                          </m:sub>
+                        </m:sSub>
+                        <m:r>
+                          <a:rPr lang="en-US" sz="1800" b="0" i="0" smtClean="0">
+                            <a:latin typeface="Cambria Math" panose="02040503050406030204" pitchFamily="18" charset="0"/>
+                          </a:rPr>
+                          <m:t>,</m:t>
+                        </m:r>
+                        <m:sSub>
+                          <m:sSubPr>
+                            <m:ctrlPr>
+                              <a:rPr lang="en-US" sz="1800" b="0" i="1" smtClean="0">
+                                <a:latin typeface="Cambria Math" panose="02040503050406030204" pitchFamily="18" charset="0"/>
+                              </a:rPr>
+                            </m:ctrlPr>
+                          </m:sSubPr>
+                          <m:e>
+                            <m:r>
+                              <m:rPr>
+                                <m:sty m:val="p"/>
+                              </m:rPr>
+                              <a:rPr lang="en-US" sz="1800" b="0" i="0" smtClean="0">
+                                <a:latin typeface="Cambria Math" panose="02040503050406030204" pitchFamily="18" charset="0"/>
+                              </a:rPr>
+                              <m:t>X</m:t>
+                            </m:r>
+                          </m:e>
+                          <m:sub>
+                            <m:r>
+                              <a:rPr lang="en-US" sz="1800" b="0" i="0" smtClean="0">
+                                <a:latin typeface="Cambria Math" panose="02040503050406030204" pitchFamily="18" charset="0"/>
+                              </a:rPr>
+                              <m:t>2</m:t>
+                            </m:r>
+                          </m:sub>
+                        </m:sSub>
+                      </m:e>
+                    </m:d>
+                    <m:r>
+                      <a:rPr lang="en-US" sz="1800" b="0" i="0" smtClean="0">
+                        <a:latin typeface="Cambria Math" panose="02040503050406030204" pitchFamily="18" charset="0"/>
+                      </a:rPr>
+                      <m:t>…</m:t>
+                    </m:r>
+                  </m:oMath>
+                </a14:m>
+                <a:br>
+                  <a:rPr lang="en-US" sz="1800" b="0" i="0" dirty="0">
+                    <a:latin typeface="Cambria Math" panose="02040503050406030204" pitchFamily="18" charset="0"/>
+                  </a:rPr>
+                </a:br>
+                <a:r>
+                  <a:rPr lang="en-US" sz="1800" b="0" i="0" dirty="0">
+                    <a:latin typeface="Cambria Math" panose="02040503050406030204" pitchFamily="18" charset="0"/>
+                  </a:rPr>
+                  <a:t>				     	         </a:t>
+                </a:r>
+                <a14:m>
+                  <m:oMath xmlns:m="http://schemas.openxmlformats.org/officeDocument/2006/math">
+                    <m:r>
+                      <a:rPr lang="en-US" sz="1800" b="0" i="0" smtClean="0">
+                        <a:latin typeface="Cambria Math" panose="02040503050406030204" pitchFamily="18" charset="0"/>
+                      </a:rPr>
+                      <m:t>=</m:t>
+                    </m:r>
+                    <m:nary>
+                      <m:naryPr>
+                        <m:chr m:val="∏"/>
+                        <m:ctrlPr>
+                          <a:rPr lang="en-US" sz="1800" b="0" i="1" smtClean="0">
+                            <a:latin typeface="Cambria Math" panose="02040503050406030204" pitchFamily="18" charset="0"/>
+                          </a:rPr>
+                        </m:ctrlPr>
+                      </m:naryPr>
+                      <m:sub>
+                        <m:r>
+                          <m:rPr>
+                            <m:brk m:alnAt="23"/>
+                          </m:rPr>
+                          <a:rPr lang="en-US" sz="1800" b="0" i="1" smtClean="0">
+                            <a:latin typeface="Cambria Math" panose="02040503050406030204" pitchFamily="18" charset="0"/>
+                          </a:rPr>
+                          <m:t>𝑖</m:t>
+                        </m:r>
+                        <m:r>
+                          <a:rPr lang="en-US" sz="1800" b="0" i="1" smtClean="0">
+                            <a:latin typeface="Cambria Math" panose="02040503050406030204" pitchFamily="18" charset="0"/>
+                          </a:rPr>
+                          <m:t>=1</m:t>
+                        </m:r>
+                      </m:sub>
+                      <m:sup>
+                        <m:r>
+                          <a:rPr lang="en-US" sz="1800" b="0" i="1" smtClean="0">
+                            <a:latin typeface="Cambria Math" panose="02040503050406030204" pitchFamily="18" charset="0"/>
+                          </a:rPr>
+                          <m:t>𝑛</m:t>
+                        </m:r>
+                      </m:sup>
+                      <m:e>
+                        <m:r>
+                          <a:rPr lang="en-US" sz="1800" b="1" i="1" smtClean="0">
+                            <a:latin typeface="Cambria Math" panose="02040503050406030204" pitchFamily="18" charset="0"/>
+                          </a:rPr>
+                          <m:t>𝑷</m:t>
+                        </m:r>
+                        <m:r>
+                          <a:rPr lang="en-US" sz="1800" b="0" i="1" smtClean="0">
+                            <a:latin typeface="Cambria Math" panose="02040503050406030204" pitchFamily="18" charset="0"/>
+                          </a:rPr>
+                          <m:t>(</m:t>
+                        </m:r>
+                        <m:r>
+                          <a:rPr lang="en-US" sz="1800" b="0" i="1" smtClean="0">
+                            <a:latin typeface="Cambria Math" panose="02040503050406030204" pitchFamily="18" charset="0"/>
+                          </a:rPr>
+                          <m:t>𝑋</m:t>
+                        </m:r>
+                        <m:r>
+                          <a:rPr lang="en-US" sz="1800" b="0" i="1" smtClean="0">
+                            <a:latin typeface="Cambria Math" panose="02040503050406030204" pitchFamily="18" charset="0"/>
+                          </a:rPr>
+                          <m:t>_</m:t>
+                        </m:r>
+                        <m:r>
+                          <a:rPr lang="en-US" sz="1800" b="0" i="1" smtClean="0">
+                            <a:latin typeface="Cambria Math" panose="02040503050406030204" pitchFamily="18" charset="0"/>
+                          </a:rPr>
+                          <m:t>𝑖</m:t>
+                        </m:r>
+                        <m:r>
+                          <a:rPr lang="en-US" sz="1800" b="0" i="1" smtClean="0">
+                            <a:latin typeface="Cambria Math" panose="02040503050406030204" pitchFamily="18" charset="0"/>
+                          </a:rPr>
+                          <m:t>|</m:t>
+                        </m:r>
+                        <m:sSub>
+                          <m:sSubPr>
+                            <m:ctrlPr>
+                              <a:rPr lang="en-US" sz="1800" b="0" i="1" smtClean="0">
+                                <a:latin typeface="Cambria Math" panose="02040503050406030204" pitchFamily="18" charset="0"/>
+                              </a:rPr>
+                            </m:ctrlPr>
+                          </m:sSubPr>
+                          <m:e>
+                            <m:r>
+                              <a:rPr lang="en-US" sz="1800" b="0" i="1" smtClean="0">
+                                <a:latin typeface="Cambria Math" panose="02040503050406030204" pitchFamily="18" charset="0"/>
+                              </a:rPr>
+                              <m:t>𝑋</m:t>
+                            </m:r>
+                          </m:e>
+                          <m:sub>
+                            <m:r>
+                              <a:rPr lang="en-US" sz="1800" b="0" i="1" smtClean="0">
+                                <a:latin typeface="Cambria Math" panose="02040503050406030204" pitchFamily="18" charset="0"/>
+                              </a:rPr>
+                              <m:t>1</m:t>
+                            </m:r>
+                          </m:sub>
+                        </m:sSub>
+                        <m:r>
+                          <a:rPr lang="en-US" sz="1800" b="0" i="1" smtClean="0">
+                            <a:latin typeface="Cambria Math" panose="02040503050406030204" pitchFamily="18" charset="0"/>
+                          </a:rPr>
+                          <m:t>,…,</m:t>
+                        </m:r>
+                        <m:sSub>
+                          <m:sSubPr>
+                            <m:ctrlPr>
+                              <a:rPr lang="en-US" sz="1800" b="0" i="1" smtClean="0">
+                                <a:latin typeface="Cambria Math" panose="02040503050406030204" pitchFamily="18" charset="0"/>
+                              </a:rPr>
+                            </m:ctrlPr>
+                          </m:sSubPr>
+                          <m:e>
+                            <m:r>
+                              <a:rPr lang="en-US" sz="1800" b="0" i="1" smtClean="0">
+                                <a:latin typeface="Cambria Math" panose="02040503050406030204" pitchFamily="18" charset="0"/>
+                              </a:rPr>
+                              <m:t>𝑋</m:t>
+                            </m:r>
+                          </m:e>
+                          <m:sub>
+                            <m:r>
+                              <a:rPr lang="en-US" sz="1800" b="0" i="1" smtClean="0">
+                                <a:latin typeface="Cambria Math" panose="02040503050406030204" pitchFamily="18" charset="0"/>
+                              </a:rPr>
+                              <m:t>𝑖</m:t>
+                            </m:r>
+                            <m:r>
+                              <a:rPr lang="en-US" sz="1800" b="0" i="1" smtClean="0">
+                                <a:latin typeface="Cambria Math" panose="02040503050406030204" pitchFamily="18" charset="0"/>
+                              </a:rPr>
+                              <m:t>−1</m:t>
+                            </m:r>
+                          </m:sub>
+                        </m:sSub>
+                        <m:r>
+                          <a:rPr lang="en-US" sz="1800" b="0" i="1" smtClean="0">
+                            <a:latin typeface="Cambria Math" panose="02040503050406030204" pitchFamily="18" charset="0"/>
+                          </a:rPr>
+                          <m:t>)</m:t>
+                        </m:r>
+                      </m:e>
+                    </m:nary>
+                  </m:oMath>
+                </a14:m>
+                <a:r>
+                  <a:rPr lang="en-US" sz="1800" b="0" dirty="0"/>
+                  <a:t> </a:t>
+                </a:r>
               </a:p>
               <a:p>
                 <a:pPr>
@@ -21831,30 +22739,172 @@
                   <a:defRPr/>
                 </a:pPr>
                 <a:r>
-                  <a:rPr lang="en-US" sz="2000" dirty="0"/>
-                  <a:t>Chain rule </a:t>
+                  <a:rPr lang="en-US" sz="1800" dirty="0"/>
+                  <a:t>Conditional probability	 </a:t>
                 </a:r>
-              </a:p>
-              <a:p>
-                <a:pPr marL="0" indent="0">
-                  <a:buNone/>
-                  <a:defRPr/>
-                </a:pPr>
-                <a:endParaRPr lang="en-US" sz="2000" dirty="0"/>
-              </a:p>
-              <a:p>
-                <a:pPr marL="0" indent="0">
-                  <a:buNone/>
-                  <a:defRPr/>
-                </a:pPr>
-                <a:endParaRPr lang="en-US" sz="2000" dirty="0"/>
-              </a:p>
-              <a:p>
-                <a:pPr marL="0" indent="0">
-                  <a:buNone/>
-                  <a:defRPr/>
-                </a:pPr>
-                <a:endParaRPr lang="en-US" sz="2000" dirty="0"/>
+                <a14:m>
+                  <m:oMath xmlns:m="http://schemas.openxmlformats.org/officeDocument/2006/math">
+                    <m:r>
+                      <a:rPr lang="en-US" sz="1800" b="0" i="1" smtClean="0">
+                        <a:latin typeface="Cambria Math" panose="02040503050406030204" pitchFamily="18" charset="0"/>
+                      </a:rPr>
+                      <m:t>𝑃</m:t>
+                    </m:r>
+                    <m:d>
+                      <m:dPr>
+                        <m:ctrlPr>
+                          <a:rPr lang="en-US" sz="1800" b="0" i="1" smtClean="0">
+                            <a:latin typeface="Cambria Math" panose="02040503050406030204" pitchFamily="18" charset="0"/>
+                          </a:rPr>
+                        </m:ctrlPr>
+                      </m:dPr>
+                      <m:e>
+                        <m:r>
+                          <a:rPr lang="en-US" sz="1800" b="0" i="1" smtClean="0">
+                            <a:latin typeface="Cambria Math" panose="02040503050406030204" pitchFamily="18" charset="0"/>
+                          </a:rPr>
+                          <m:t>𝑥</m:t>
+                        </m:r>
+                      </m:e>
+                      <m:e>
+                        <m:r>
+                          <a:rPr lang="en-US" sz="1800" b="0" i="1" smtClean="0">
+                            <a:latin typeface="Cambria Math" panose="02040503050406030204" pitchFamily="18" charset="0"/>
+                          </a:rPr>
+                          <m:t>𝑦</m:t>
+                        </m:r>
+                      </m:e>
+                    </m:d>
+                    <m:r>
+                      <a:rPr lang="en-US" sz="1800" b="0" i="1" smtClean="0">
+                        <a:latin typeface="Cambria Math" panose="02040503050406030204" pitchFamily="18" charset="0"/>
+                      </a:rPr>
+                      <m:t>= </m:t>
+                    </m:r>
+                    <m:f>
+                      <m:fPr>
+                        <m:ctrlPr>
+                          <a:rPr lang="en-US" sz="1800" b="0" i="1" smtClean="0">
+                            <a:latin typeface="Cambria Math" panose="02040503050406030204" pitchFamily="18" charset="0"/>
+                          </a:rPr>
+                        </m:ctrlPr>
+                      </m:fPr>
+                      <m:num>
+                        <m:r>
+                          <a:rPr lang="en-US" sz="1800" b="0" i="1" smtClean="0">
+                            <a:latin typeface="Cambria Math" panose="02040503050406030204" pitchFamily="18" charset="0"/>
+                          </a:rPr>
+                          <m:t>𝑃</m:t>
+                        </m:r>
+                        <m:r>
+                          <a:rPr lang="en-US" sz="1800" b="0" i="1" smtClean="0">
+                            <a:latin typeface="Cambria Math" panose="02040503050406030204" pitchFamily="18" charset="0"/>
+                          </a:rPr>
+                          <m:t>(</m:t>
+                        </m:r>
+                        <m:r>
+                          <a:rPr lang="en-US" sz="1800" b="0" i="1" smtClean="0">
+                            <a:latin typeface="Cambria Math" panose="02040503050406030204" pitchFamily="18" charset="0"/>
+                          </a:rPr>
+                          <m:t>𝑥</m:t>
+                        </m:r>
+                        <m:r>
+                          <a:rPr lang="en-US" sz="1800" b="0" i="1" smtClean="0">
+                            <a:latin typeface="Cambria Math" panose="02040503050406030204" pitchFamily="18" charset="0"/>
+                          </a:rPr>
+                          <m:t>,</m:t>
+                        </m:r>
+                        <m:r>
+                          <a:rPr lang="en-US" sz="1800" b="0" i="1" smtClean="0">
+                            <a:latin typeface="Cambria Math" panose="02040503050406030204" pitchFamily="18" charset="0"/>
+                          </a:rPr>
+                          <m:t>𝑦</m:t>
+                        </m:r>
+                        <m:r>
+                          <a:rPr lang="en-US" sz="1800" b="0" i="1" smtClean="0">
+                            <a:latin typeface="Cambria Math" panose="02040503050406030204" pitchFamily="18" charset="0"/>
+                          </a:rPr>
+                          <m:t>)</m:t>
+                        </m:r>
+                      </m:num>
+                      <m:den>
+                        <m:r>
+                          <a:rPr lang="en-US" sz="1800" b="0" i="1" smtClean="0">
+                            <a:latin typeface="Cambria Math" panose="02040503050406030204" pitchFamily="18" charset="0"/>
+                          </a:rPr>
+                          <m:t>𝑃</m:t>
+                        </m:r>
+                        <m:r>
+                          <a:rPr lang="en-US" sz="1800" b="0" i="1" smtClean="0">
+                            <a:latin typeface="Cambria Math" panose="02040503050406030204" pitchFamily="18" charset="0"/>
+                          </a:rPr>
+                          <m:t>(</m:t>
+                        </m:r>
+                        <m:r>
+                          <a:rPr lang="en-US" sz="1800" b="0" i="1" smtClean="0">
+                            <a:latin typeface="Cambria Math" panose="02040503050406030204" pitchFamily="18" charset="0"/>
+                          </a:rPr>
+                          <m:t>𝑦</m:t>
+                        </m:r>
+                        <m:r>
+                          <a:rPr lang="en-US" sz="1800" b="0" i="1" smtClean="0">
+                            <a:latin typeface="Cambria Math" panose="02040503050406030204" pitchFamily="18" charset="0"/>
+                          </a:rPr>
+                          <m:t>)</m:t>
+                        </m:r>
+                      </m:den>
+                    </m:f>
+                    <m:r>
+                      <a:rPr lang="en-US" sz="1800" b="0" i="1" smtClean="0">
+                        <a:latin typeface="Cambria Math" panose="02040503050406030204" pitchFamily="18" charset="0"/>
+                      </a:rPr>
+                      <m:t>=</m:t>
+                    </m:r>
+                    <m:r>
+                      <a:rPr lang="en-US" sz="1800" b="0" i="1" smtClean="0">
+                        <a:latin typeface="Cambria Math" panose="02040503050406030204" pitchFamily="18" charset="0"/>
+                      </a:rPr>
+                      <m:t>𝛼</m:t>
+                    </m:r>
+                    <m:r>
+                      <a:rPr lang="en-US" sz="1800" b="0" i="1" smtClean="0">
+                        <a:latin typeface="Cambria Math" panose="02040503050406030204" pitchFamily="18" charset="0"/>
+                      </a:rPr>
+                      <m:t>𝑃</m:t>
+                    </m:r>
+                    <m:r>
+                      <a:rPr lang="en-US" sz="1800" b="0" i="1" smtClean="0">
+                        <a:latin typeface="Cambria Math" panose="02040503050406030204" pitchFamily="18" charset="0"/>
+                      </a:rPr>
+                      <m:t>(</m:t>
+                    </m:r>
+                    <m:r>
+                      <a:rPr lang="en-US" sz="1800" b="0" i="1" smtClean="0">
+                        <a:latin typeface="Cambria Math" panose="02040503050406030204" pitchFamily="18" charset="0"/>
+                      </a:rPr>
+                      <m:t>𝑥</m:t>
+                    </m:r>
+                    <m:r>
+                      <a:rPr lang="en-US" sz="1800" b="0" i="1" smtClean="0">
+                        <a:latin typeface="Cambria Math" panose="02040503050406030204" pitchFamily="18" charset="0"/>
+                      </a:rPr>
+                      <m:t>,</m:t>
+                    </m:r>
+                    <m:r>
+                      <a:rPr lang="en-US" sz="1800" b="0" i="1" smtClean="0">
+                        <a:latin typeface="Cambria Math" panose="02040503050406030204" pitchFamily="18" charset="0"/>
+                      </a:rPr>
+                      <m:t>𝑦</m:t>
+                    </m:r>
+                    <m:r>
+                      <a:rPr lang="en-US" sz="1800" b="0" i="1" smtClean="0">
+                        <a:latin typeface="Cambria Math" panose="02040503050406030204" pitchFamily="18" charset="0"/>
+                      </a:rPr>
+                      <m:t>)</m:t>
+                    </m:r>
+                  </m:oMath>
+                </a14:m>
+                <a:endParaRPr lang="en-US" sz="1800" dirty="0"/>
               </a:p>
               <a:p>
                 <a:pPr>
@@ -21862,28 +22912,83 @@
                   <a:buChar char="§"/>
                   <a:defRPr/>
                 </a:pPr>
+                <a:endParaRPr lang="en-US" sz="1800" dirty="0"/>
+              </a:p>
+              <a:p>
+                <a:pPr>
+                  <a:buFont typeface="Wingdings" charset="0"/>
+                  <a:buChar char="§"/>
+                  <a:defRPr/>
+                </a:pPr>
+                <a:r>
+                  <a:rPr lang="en-US" sz="1800" dirty="0"/>
+                  <a:t>Independence</a:t>
+                </a:r>
+              </a:p>
+              <a:p>
+                <a:pPr lvl="1">
+                  <a:buFont typeface="Wingdings" charset="0"/>
+                  <a:buChar char="§"/>
+                  <a:defRPr/>
+                </a:pPr>
+                <a:r>
+                  <a:rPr lang="en-US" b="0" dirty="0"/>
+                  <a:t> </a:t>
+                </a:r>
                 <a14:m>
                   <m:oMath xmlns:m="http://schemas.openxmlformats.org/officeDocument/2006/math">
                     <m:r>
-                      <a:rPr lang="en-US" sz="2000" i="1" dirty="0" smtClean="0">
+                      <a:rPr lang="en-US" i="1">
                         <a:latin typeface="Cambria Math" panose="02040503050406030204" pitchFamily="18" charset="0"/>
                       </a:rPr>
                       <m:t>𝑋</m:t>
                     </m:r>
                     <m:r>
-                      <a:rPr lang="en-US" sz="2000" i="1" dirty="0" smtClean="0">
+                      <a:rPr lang="en-US" i="1">
+                        <a:latin typeface="Cambria Math" panose="02040503050406030204" pitchFamily="18" charset="0"/>
+                      </a:rPr>
+                      <m:t>⫫</m:t>
+                    </m:r>
+                    <m:r>
+                      <a:rPr lang="en-US" i="1">
+                        <a:latin typeface="Cambria Math" panose="02040503050406030204" pitchFamily="18" charset="0"/>
+                      </a:rPr>
+                      <m:t>𝑌</m:t>
+                    </m:r>
+                  </m:oMath>
+                </a14:m>
+                <a:r>
+                  <a:rPr lang="en-US" b="0" dirty="0"/>
+                  <a:t>: </a:t>
+                </a:r>
+                <a14:m>
+                  <m:oMath xmlns:m="http://schemas.openxmlformats.org/officeDocument/2006/math">
+                    <m:r>
+                      <a:rPr lang="en-US" b="0" i="1" smtClean="0">
+                        <a:latin typeface="Cambria Math" panose="02040503050406030204" pitchFamily="18" charset="0"/>
+                      </a:rPr>
+                      <m:t> </m:t>
+                    </m:r>
+                    <m:r>
+                      <a:rPr lang="en-US" i="1" dirty="0" smtClean="0">
+                        <a:latin typeface="Cambria Math" panose="02040503050406030204" pitchFamily="18" charset="0"/>
+                      </a:rPr>
+                      <m:t>𝑋</m:t>
+                    </m:r>
+                    <m:r>
+                      <a:rPr lang="en-US" i="1" dirty="0" smtClean="0">
                         <a:latin typeface="Cambria Math" panose="02040503050406030204" pitchFamily="18" charset="0"/>
                       </a:rPr>
                       <m:t>, </m:t>
                     </m:r>
                     <m:r>
-                      <a:rPr lang="en-US" sz="2000" i="1" dirty="0" smtClean="0">
+                      <a:rPr lang="en-US" i="1" dirty="0" smtClean="0">
                         <a:latin typeface="Cambria Math" panose="02040503050406030204" pitchFamily="18" charset="0"/>
                       </a:rPr>
                       <m:t>𝑌</m:t>
                     </m:r>
                     <m:r>
-                      <a:rPr lang="en-US" sz="2000" i="1" dirty="0" smtClean="0">
+                      <a:rPr lang="en-US" i="1" dirty="0" smtClean="0">
                         <a:latin typeface="Cambria Math" panose="02040503050406030204" pitchFamily="18" charset="0"/>
                       </a:rPr>
                       <m:t> </m:t>
@@ -21891,21 +22996,182 @@
                   </m:oMath>
                 </a14:m>
                 <a:r>
-                  <a:rPr lang="en-US" sz="2000" dirty="0"/>
-                  <a:t>are independent if and only if:</a:t>
+                  <a:rPr lang="en-US" dirty="0"/>
+                  <a:t>are independent </a:t>
                 </a:r>
+                <a14:m>
+                  <m:oMath xmlns:m="http://schemas.openxmlformats.org/officeDocument/2006/math">
+                    <m:r>
+                      <a:rPr lang="en-US" i="1">
+                        <a:latin typeface="Cambria Math" panose="02040503050406030204" pitchFamily="18" charset="0"/>
+                      </a:rPr>
+                      <m:t>𝑋</m:t>
+                    </m:r>
+                    <m:r>
+                      <a:rPr lang="en-US" i="1">
+                        <a:latin typeface="Cambria Math" panose="02040503050406030204" pitchFamily="18" charset="0"/>
+                      </a:rPr>
+                      <m:t>⫫</m:t>
+                    </m:r>
+                    <m:r>
+                      <a:rPr lang="en-US" i="1">
+                        <a:latin typeface="Cambria Math" panose="02040503050406030204" pitchFamily="18" charset="0"/>
+                      </a:rPr>
+                      <m:t>𝑌</m:t>
+                    </m:r>
+                    <m:r>
+                      <m:rPr>
+                        <m:nor/>
+                      </m:rPr>
+                      <a:rPr lang="en-US"/>
+                      <m:t> </m:t>
+                    </m:r>
+                  </m:oMath>
+                </a14:m>
+                <a:r>
+                  <a:rPr lang="en-US" dirty="0"/>
+                  <a:t>() if and only if: </a:t>
+                </a:r>
+                <a:br>
+                  <a:rPr lang="en-US" b="0" i="1" dirty="0">
+                    <a:latin typeface="Cambria Math" panose="02040503050406030204" pitchFamily="18" charset="0"/>
+                  </a:rPr>
+                </a:br>
+                <a14:m>
+                  <m:oMath xmlns:m="http://schemas.openxmlformats.org/officeDocument/2006/math">
+                    <m:r>
+                      <a:rPr lang="en-US" b="0" i="1" smtClean="0">
+                        <a:latin typeface="Cambria Math" panose="02040503050406030204" pitchFamily="18" charset="0"/>
+                      </a:rPr>
+                      <m:t>∀</m:t>
+                    </m:r>
+                    <m:r>
+                      <a:rPr lang="en-US" b="0" i="1" smtClean="0">
+                        <a:latin typeface="Cambria Math" panose="02040503050406030204" pitchFamily="18" charset="0"/>
+                      </a:rPr>
+                      <m:t>𝑥</m:t>
+                    </m:r>
+                    <m:r>
+                      <a:rPr lang="en-US" b="0" i="1" smtClean="0">
+                        <a:latin typeface="Cambria Math" panose="02040503050406030204" pitchFamily="18" charset="0"/>
+                      </a:rPr>
+                      <m:t>,</m:t>
+                    </m:r>
+                    <m:r>
+                      <a:rPr lang="en-US" b="0" i="1" smtClean="0">
+                        <a:latin typeface="Cambria Math" panose="02040503050406030204" pitchFamily="18" charset="0"/>
+                      </a:rPr>
+                      <m:t>𝑦</m:t>
+                    </m:r>
+                    <m:r>
+                      <a:rPr lang="en-US" b="0" i="1" smtClean="0">
+                        <a:latin typeface="Cambria Math" panose="02040503050406030204" pitchFamily="18" charset="0"/>
+                      </a:rPr>
+                      <m:t>:</m:t>
+                    </m:r>
+                    <m:r>
+                      <a:rPr lang="en-US" b="0" i="1" smtClean="0">
+                        <a:latin typeface="Cambria Math" panose="02040503050406030204" pitchFamily="18" charset="0"/>
+                      </a:rPr>
+                      <m:t>𝑃</m:t>
+                    </m:r>
+                    <m:d>
+                      <m:dPr>
+                        <m:ctrlPr>
+                          <a:rPr lang="en-US" b="0" i="1" smtClean="0">
+                            <a:latin typeface="Cambria Math" panose="02040503050406030204" pitchFamily="18" charset="0"/>
+                          </a:rPr>
+                        </m:ctrlPr>
+                      </m:dPr>
+                      <m:e>
+                        <m:r>
+                          <a:rPr lang="en-US" b="0" i="1" smtClean="0">
+                            <a:latin typeface="Cambria Math" panose="02040503050406030204" pitchFamily="18" charset="0"/>
+                          </a:rPr>
+                          <m:t>𝑥</m:t>
+                        </m:r>
+                        <m:r>
+                          <a:rPr lang="en-US" b="0" i="1" smtClean="0">
+                            <a:latin typeface="Cambria Math" panose="02040503050406030204" pitchFamily="18" charset="0"/>
+                          </a:rPr>
+                          <m:t>,</m:t>
+                        </m:r>
+                        <m:r>
+                          <a:rPr lang="en-US" b="0" i="1" smtClean="0">
+                            <a:latin typeface="Cambria Math" panose="02040503050406030204" pitchFamily="18" charset="0"/>
+                          </a:rPr>
+                          <m:t>𝑦</m:t>
+                        </m:r>
+                      </m:e>
+                    </m:d>
+                    <m:r>
+                      <a:rPr lang="en-US" b="0" i="1" smtClean="0">
+                        <a:latin typeface="Cambria Math" panose="02040503050406030204" pitchFamily="18" charset="0"/>
+                      </a:rPr>
+                      <m:t>=</m:t>
+                    </m:r>
+                    <m:r>
+                      <a:rPr lang="en-US" b="0" i="1" smtClean="0">
+                        <a:latin typeface="Cambria Math" panose="02040503050406030204" pitchFamily="18" charset="0"/>
+                      </a:rPr>
+                      <m:t>𝑃</m:t>
+                    </m:r>
+                    <m:d>
+                      <m:dPr>
+                        <m:ctrlPr>
+                          <a:rPr lang="en-US" b="0" i="1" smtClean="0">
+                            <a:latin typeface="Cambria Math" panose="02040503050406030204" pitchFamily="18" charset="0"/>
+                          </a:rPr>
+                        </m:ctrlPr>
+                      </m:dPr>
+                      <m:e>
+                        <m:r>
+                          <a:rPr lang="en-US" b="0" i="1" smtClean="0">
+                            <a:latin typeface="Cambria Math" panose="02040503050406030204" pitchFamily="18" charset="0"/>
+                          </a:rPr>
+                          <m:t>𝑥</m:t>
+                        </m:r>
+                      </m:e>
+                    </m:d>
+                    <m:r>
+                      <a:rPr lang="en-US" b="0" i="1" smtClean="0">
+                        <a:latin typeface="Cambria Math" panose="02040503050406030204" pitchFamily="18" charset="0"/>
+                      </a:rPr>
+                      <m:t>𝑃</m:t>
+                    </m:r>
+                    <m:r>
+                      <a:rPr lang="en-US" b="0" i="1" smtClean="0">
+                        <a:latin typeface="Cambria Math" panose="02040503050406030204" pitchFamily="18" charset="0"/>
+                      </a:rPr>
+                      <m:t>(</m:t>
+                    </m:r>
+                    <m:r>
+                      <a:rPr lang="en-US" b="0" i="1" smtClean="0">
+                        <a:latin typeface="Cambria Math" panose="02040503050406030204" pitchFamily="18" charset="0"/>
+                      </a:rPr>
+                      <m:t>𝑦</m:t>
+                    </m:r>
+                    <m:r>
+                      <a:rPr lang="en-US" b="0" i="1" smtClean="0">
+                        <a:latin typeface="Cambria Math" panose="02040503050406030204" pitchFamily="18" charset="0"/>
+                      </a:rPr>
+                      <m:t>)</m:t>
+                    </m:r>
+                  </m:oMath>
+                </a14:m>
+                <a:endParaRPr lang="en-US" dirty="0"/>
               </a:p>
               <a:p>
-                <a:pPr marL="0" indent="0">
+                <a:pPr marL="342900" lvl="1" indent="0">
                   <a:buNone/>
                   <a:defRPr/>
                 </a:pPr>
-                <a:endParaRPr lang="en-US" sz="2000" i="1" dirty="0">
+                <a:endParaRPr lang="en-US" i="1" dirty="0">
                   <a:latin typeface="Cambria Math" panose="02040503050406030204" pitchFamily="18" charset="0"/>
                 </a:endParaRPr>
               </a:p>
               <a:p>
-                <a:pPr>
+                <a:pPr lvl="1">
                   <a:buFont typeface="Wingdings" charset="0"/>
                   <a:buChar char="§"/>
                   <a:defRPr/>
@@ -21913,7 +23179,45 @@
                 <a14:m>
                   <m:oMath xmlns:m="http://schemas.openxmlformats.org/officeDocument/2006/math">
                     <m:r>
-                      <a:rPr lang="en-US" sz="2000" i="1" dirty="0" smtClean="0">
+                      <a:rPr lang="en-US" i="1">
+                        <a:latin typeface="Cambria Math" panose="02040503050406030204" pitchFamily="18" charset="0"/>
+                      </a:rPr>
+                      <m:t>𝑋</m:t>
+                    </m:r>
+                    <m:r>
+                      <a:rPr lang="en-US" i="1">
+                        <a:latin typeface="Cambria Math" panose="02040503050406030204" pitchFamily="18" charset="0"/>
+                      </a:rPr>
+                      <m:t>⫫</m:t>
+                    </m:r>
+                    <m:r>
+                      <a:rPr lang="en-US" i="1">
+                        <a:latin typeface="Cambria Math" panose="02040503050406030204" pitchFamily="18" charset="0"/>
+                      </a:rPr>
+                      <m:t>𝑌</m:t>
+                    </m:r>
+                    <m:r>
+                      <a:rPr lang="en-US" i="1">
+                        <a:latin typeface="Cambria Math" panose="02040503050406030204" pitchFamily="18" charset="0"/>
+                      </a:rPr>
+                      <m:t>|</m:t>
+                    </m:r>
+                    <m:r>
+                      <a:rPr lang="en-US" i="1">
+                        <a:latin typeface="Cambria Math" panose="02040503050406030204" pitchFamily="18" charset="0"/>
+                      </a:rPr>
+                      <m:t>𝑍</m:t>
+                    </m:r>
+                  </m:oMath>
+                </a14:m>
+                <a:r>
+                  <a:rPr lang="en-US" dirty="0"/>
+                  <a:t>: </a:t>
+                </a:r>
+                <a14:m>
+                  <m:oMath xmlns:m="http://schemas.openxmlformats.org/officeDocument/2006/math">
+                    <m:r>
+                      <a:rPr lang="en-US" i="1" dirty="0" smtClean="0">
                         <a:latin typeface="Cambria Math" panose="02040503050406030204" pitchFamily="18" charset="0"/>
                       </a:rPr>
                       <m:t>𝑋</m:t>
@@ -21921,13 +23225,13 @@
                   </m:oMath>
                 </a14:m>
                 <a:r>
-                  <a:rPr lang="en-US" sz="2000" dirty="0"/>
+                  <a:rPr lang="en-US" dirty="0"/>
                   <a:t> and </a:t>
                 </a:r>
                 <a14:m>
                   <m:oMath xmlns:m="http://schemas.openxmlformats.org/officeDocument/2006/math">
                     <m:r>
-                      <a:rPr lang="en-US" sz="2000" i="1" dirty="0" smtClean="0">
+                      <a:rPr lang="en-US" i="1" dirty="0" smtClean="0">
                         <a:latin typeface="Cambria Math" panose="02040503050406030204" pitchFamily="18" charset="0"/>
                       </a:rPr>
                       <m:t>𝑌</m:t>
@@ -21935,13 +23239,13 @@
                   </m:oMath>
                 </a14:m>
                 <a:r>
-                  <a:rPr lang="en-US" sz="2000" dirty="0"/>
+                  <a:rPr lang="en-US" dirty="0"/>
                   <a:t> are conditionally independent given </a:t>
                 </a:r>
                 <a14:m>
                   <m:oMath xmlns:m="http://schemas.openxmlformats.org/officeDocument/2006/math">
                     <m:r>
-                      <a:rPr lang="en-US" sz="2000" i="1" dirty="0" smtClean="0">
+                      <a:rPr lang="en-US" i="1" dirty="0" smtClean="0">
                         <a:latin typeface="Cambria Math" panose="02040503050406030204" pitchFamily="18" charset="0"/>
                       </a:rPr>
                       <m:t>𝑍</m:t>
@@ -21949,22 +23253,180 @@
                   </m:oMath>
                 </a14:m>
                 <a:r>
-                  <a:rPr lang="en-US" sz="2000" dirty="0"/>
+                  <a:rPr lang="en-US" dirty="0"/>
                   <a:t> if and only if:</a:t>
                 </a:r>
-              </a:p>
-              <a:p>
-                <a:pPr>
-                  <a:buFont typeface="Wingdings" charset="0"/>
-                  <a:buChar char="§"/>
-                  <a:defRPr/>
-                </a:pPr>
-                <a:endParaRPr lang="en-US" sz="2000" dirty="0"/>
+                <a:br>
+                  <a:rPr lang="en-US" dirty="0"/>
+                </a:br>
+                <a14:m>
+                  <m:oMath xmlns:m="http://schemas.openxmlformats.org/officeDocument/2006/math">
+                    <m:r>
+                      <a:rPr lang="en-US" b="0" i="1" smtClean="0">
+                        <a:latin typeface="Cambria Math" panose="02040503050406030204" pitchFamily="18" charset="0"/>
+                      </a:rPr>
+                      <m:t>∀</m:t>
+                    </m:r>
+                    <m:r>
+                      <a:rPr lang="en-US" b="0" i="1" smtClean="0">
+                        <a:latin typeface="Cambria Math" panose="02040503050406030204" pitchFamily="18" charset="0"/>
+                      </a:rPr>
+                      <m:t>𝑥</m:t>
+                    </m:r>
+                    <m:r>
+                      <a:rPr lang="en-US" b="0" i="1" smtClean="0">
+                        <a:latin typeface="Cambria Math" panose="02040503050406030204" pitchFamily="18" charset="0"/>
+                      </a:rPr>
+                      <m:t>,</m:t>
+                    </m:r>
+                    <m:r>
+                      <a:rPr lang="en-US" b="0" i="1" smtClean="0">
+                        <a:latin typeface="Cambria Math" panose="02040503050406030204" pitchFamily="18" charset="0"/>
+                      </a:rPr>
+                      <m:t>𝑦</m:t>
+                    </m:r>
+                    <m:r>
+                      <a:rPr lang="en-US" b="0" i="1" smtClean="0">
+                        <a:latin typeface="Cambria Math" panose="02040503050406030204" pitchFamily="18" charset="0"/>
+                      </a:rPr>
+                      <m:t>,</m:t>
+                    </m:r>
+                    <m:r>
+                      <a:rPr lang="en-US" b="0" i="1" smtClean="0">
+                        <a:latin typeface="Cambria Math" panose="02040503050406030204" pitchFamily="18" charset="0"/>
+                      </a:rPr>
+                      <m:t>𝑧</m:t>
+                    </m:r>
+                    <m:r>
+                      <a:rPr lang="en-US" b="0" i="1" smtClean="0">
+                        <a:latin typeface="Cambria Math" panose="02040503050406030204" pitchFamily="18" charset="0"/>
+                      </a:rPr>
+                      <m:t>:</m:t>
+                    </m:r>
+                    <m:r>
+                      <a:rPr lang="en-US" b="0" i="1" smtClean="0">
+                        <a:latin typeface="Cambria Math" panose="02040503050406030204" pitchFamily="18" charset="0"/>
+                      </a:rPr>
+                      <m:t>𝑃</m:t>
+                    </m:r>
+                    <m:d>
+                      <m:dPr>
+                        <m:ctrlPr>
+                          <a:rPr lang="en-US" b="0" i="1" smtClean="0">
+                            <a:latin typeface="Cambria Math" panose="02040503050406030204" pitchFamily="18" charset="0"/>
+                          </a:rPr>
+                        </m:ctrlPr>
+                      </m:dPr>
+                      <m:e>
+                        <m:r>
+                          <a:rPr lang="en-US" b="0" i="1" smtClean="0">
+                            <a:latin typeface="Cambria Math" panose="02040503050406030204" pitchFamily="18" charset="0"/>
+                          </a:rPr>
+                          <m:t>𝑥</m:t>
+                        </m:r>
+                        <m:r>
+                          <a:rPr lang="en-US" b="0" i="1" smtClean="0">
+                            <a:latin typeface="Cambria Math" panose="02040503050406030204" pitchFamily="18" charset="0"/>
+                          </a:rPr>
+                          <m:t>,</m:t>
+                        </m:r>
+                        <m:r>
+                          <a:rPr lang="en-US" b="0" i="1" smtClean="0">
+                            <a:latin typeface="Cambria Math" panose="02040503050406030204" pitchFamily="18" charset="0"/>
+                          </a:rPr>
+                          <m:t>𝑦</m:t>
+                        </m:r>
+                      </m:e>
+                      <m:e>
+                        <m:r>
+                          <a:rPr lang="en-US" b="0" i="1" smtClean="0">
+                            <a:latin typeface="Cambria Math" panose="02040503050406030204" pitchFamily="18" charset="0"/>
+                          </a:rPr>
+                          <m:t>𝑧</m:t>
+                        </m:r>
+                      </m:e>
+                    </m:d>
+                    <m:r>
+                      <a:rPr lang="en-US" b="0" i="1" smtClean="0">
+                        <a:latin typeface="Cambria Math" panose="02040503050406030204" pitchFamily="18" charset="0"/>
+                      </a:rPr>
+                      <m:t>=</m:t>
+                    </m:r>
+                    <m:r>
+                      <a:rPr lang="en-US" b="0" i="1" smtClean="0">
+                        <a:latin typeface="Cambria Math" panose="02040503050406030204" pitchFamily="18" charset="0"/>
+                      </a:rPr>
+                      <m:t>𝑃</m:t>
+                    </m:r>
+                    <m:d>
+                      <m:dPr>
+                        <m:ctrlPr>
+                          <a:rPr lang="en-US" b="0" i="1" smtClean="0">
+                            <a:latin typeface="Cambria Math" panose="02040503050406030204" pitchFamily="18" charset="0"/>
+                          </a:rPr>
+                        </m:ctrlPr>
+                      </m:dPr>
+                      <m:e>
+                        <m:r>
+                          <a:rPr lang="en-US" b="0" i="1" smtClean="0">
+                            <a:latin typeface="Cambria Math" panose="02040503050406030204" pitchFamily="18" charset="0"/>
+                          </a:rPr>
+                          <m:t>𝑥</m:t>
+                        </m:r>
+                      </m:e>
+                      <m:e>
+                        <m:r>
+                          <a:rPr lang="en-US" b="0" i="1" smtClean="0">
+                            <a:latin typeface="Cambria Math" panose="02040503050406030204" pitchFamily="18" charset="0"/>
+                          </a:rPr>
+                          <m:t>𝑧</m:t>
+                        </m:r>
+                      </m:e>
+                    </m:d>
+                    <m:r>
+                      <a:rPr lang="en-US" b="0" i="1" smtClean="0">
+                        <a:latin typeface="Cambria Math" panose="02040503050406030204" pitchFamily="18" charset="0"/>
+                      </a:rPr>
+                      <m:t>𝑃</m:t>
+                    </m:r>
+                    <m:r>
+                      <a:rPr lang="en-US" b="0" i="1" smtClean="0">
+                        <a:latin typeface="Cambria Math" panose="02040503050406030204" pitchFamily="18" charset="0"/>
+                      </a:rPr>
+                      <m:t>(</m:t>
+                    </m:r>
+                    <m:r>
+                      <a:rPr lang="en-US" b="0" i="1" smtClean="0">
+                        <a:latin typeface="Cambria Math" panose="02040503050406030204" pitchFamily="18" charset="0"/>
+                      </a:rPr>
+                      <m:t>𝑦</m:t>
+                    </m:r>
+                    <m:r>
+                      <a:rPr lang="en-US" b="0" i="1" smtClean="0">
+                        <a:latin typeface="Cambria Math" panose="02040503050406030204" pitchFamily="18" charset="0"/>
+                      </a:rPr>
+                      <m:t>|</m:t>
+                    </m:r>
+                    <m:r>
+                      <a:rPr lang="en-US" b="0" i="1" smtClean="0">
+                        <a:latin typeface="Cambria Math" panose="02040503050406030204" pitchFamily="18" charset="0"/>
+                      </a:rPr>
+                      <m:t>𝑧</m:t>
+                    </m:r>
+                    <m:r>
+                      <a:rPr lang="en-US" b="0" i="1" smtClean="0">
+                        <a:latin typeface="Cambria Math" panose="02040503050406030204" pitchFamily="18" charset="0"/>
+                      </a:rPr>
+                      <m:t>)</m:t>
+                    </m:r>
+                  </m:oMath>
+                </a14:m>
+                <a:endParaRPr lang="en-US" dirty="0"/>
               </a:p>
             </p:txBody>
           </p:sp>
         </mc:Choice>
-        <mc:Fallback>
+        <mc:Fallback xmlns="">
           <p:sp>
             <p:nvSpPr>
               <p:cNvPr id="30722" name="Content Placeholder 2"/>
@@ -21977,734 +23439,13 @@
             </p:nvSpPr>
             <p:spPr>
               <a:xfrm>
-                <a:off x="628650" y="1644649"/>
-                <a:ext cx="7886700" cy="4351338"/>
+                <a:off x="628650" y="1447800"/>
+                <a:ext cx="7886700" cy="4548187"/>
               </a:xfrm>
               <a:blipFill>
-                <a:blip r:embed="rId7"/>
+                <a:blip r:embed="rId3"/>
                 <a:stretch>
-                  <a:fillRect l="-696" t="-1541" b="-3641"/>
-                </a:stretch>
-              </a:blipFill>
-            </p:spPr>
-            <p:txBody>
-              <a:bodyPr/>
-              <a:lstStyle/>
-              <a:p>
-                <a:r>
-                  <a:rPr lang="en-US">
-                    <a:noFill/>
-                  </a:rPr>
-                  <a:t> </a:t>
-                </a:r>
-              </a:p>
-            </p:txBody>
-          </p:sp>
-        </mc:Fallback>
-      </mc:AlternateContent>
-      <p:pic>
-        <p:nvPicPr>
-          <p:cNvPr id="17413" name="Picture 10" descr="txp_fig"/>
-          <p:cNvPicPr>
-            <a:picLocks noChangeAspect="1" noChangeArrowheads="1"/>
-          </p:cNvPicPr>
-          <p:nvPr>
-            <p:custDataLst>
-              <p:tags r:id="rId1"/>
-            </p:custDataLst>
-          </p:nvPr>
-        </p:nvPicPr>
-        <p:blipFill>
-          <a:blip r:embed="rId8" cstate="print">
-            <a:extLst>
-              <a:ext uri="{28A0092B-C50C-407E-A947-70E740481C1C}">
-                <a14:useLocalDpi xmlns:a14="http://schemas.microsoft.com/office/drawing/2010/main" val="0"/>
-              </a:ext>
-            </a:extLst>
-          </a:blip>
-          <a:srcRect/>
-          <a:stretch>
-            <a:fillRect/>
-          </a:stretch>
-        </p:blipFill>
-        <p:spPr bwMode="auto">
-          <a:xfrm>
-            <a:off x="3822787" y="2844618"/>
-            <a:ext cx="2842022" cy="286384"/>
-          </a:xfrm>
-          <a:prstGeom prst="rect">
-            <a:avLst/>
-          </a:prstGeom>
-          <a:noFill/>
-          <a:ln>
-            <a:noFill/>
-          </a:ln>
-          <a:extLst>
-            <a:ext uri="{909E8E84-426E-40dd-AFC4-6F175D3DCCD1}">
-              <a14:hiddenFill xmlns:a14="http://schemas.microsoft.com/office/drawing/2010/main" xmlns="">
-                <a:solidFill>
-                  <a:srgbClr val="FFFFFF"/>
-                </a:solidFill>
-              </a14:hiddenFill>
-            </a:ext>
-            <a:ext uri="{91240B29-F687-4f45-9708-019B960494DF}">
-              <a14:hiddenLine xmlns:a14="http://schemas.microsoft.com/office/drawing/2010/main" xmlns="" w="9525">
-                <a:solidFill>
-                  <a:srgbClr val="000000"/>
-                </a:solidFill>
-                <a:miter lim="800000"/>
-                <a:headEnd/>
-                <a:tailEnd/>
-              </a14:hiddenLine>
-            </a:ext>
-          </a:extLst>
-        </p:spPr>
-      </p:pic>
-      <p:pic>
-        <p:nvPicPr>
-          <p:cNvPr id="17414" name="Picture 4" descr="txp_fig"/>
-          <p:cNvPicPr>
-            <a:picLocks noChangeAspect="1"/>
-          </p:cNvPicPr>
-          <p:nvPr>
-            <p:custDataLst>
-              <p:tags r:id="rId2"/>
-            </p:custDataLst>
-          </p:nvPr>
-        </p:nvPicPr>
-        <p:blipFill>
-          <a:blip r:embed="rId9" cstate="print">
-            <a:extLst>
-              <a:ext uri="{28A0092B-C50C-407E-A947-70E740481C1C}">
-                <a14:useLocalDpi xmlns:a14="http://schemas.microsoft.com/office/drawing/2010/main" val="0"/>
-              </a:ext>
-            </a:extLst>
-          </a:blip>
-          <a:srcRect/>
-          <a:stretch>
-            <a:fillRect/>
-          </a:stretch>
-        </p:blipFill>
-        <p:spPr bwMode="auto">
-          <a:xfrm>
-            <a:off x="4755886" y="4988326"/>
-            <a:ext cx="3513046" cy="276225"/>
-          </a:xfrm>
-          <a:prstGeom prst="rect">
-            <a:avLst/>
-          </a:prstGeom>
-          <a:noFill/>
-          <a:ln>
-            <a:noFill/>
-          </a:ln>
-          <a:extLst>
-            <a:ext uri="{909E8E84-426E-40dd-AFC4-6F175D3DCCD1}">
-              <a14:hiddenFill xmlns:a14="http://schemas.microsoft.com/office/drawing/2010/main" xmlns="">
-                <a:solidFill>
-                  <a:srgbClr val="FFFFFF"/>
-                </a:solidFill>
-              </a14:hiddenFill>
-            </a:ext>
-            <a:ext uri="{91240B29-F687-4f45-9708-019B960494DF}">
-              <a14:hiddenLine xmlns:a14="http://schemas.microsoft.com/office/drawing/2010/main" xmlns="" w="9525">
-                <a:solidFill>
-                  <a:srgbClr val="000000"/>
-                </a:solidFill>
-                <a:miter lim="800000"/>
-                <a:headEnd/>
-                <a:tailEnd/>
-              </a14:hiddenLine>
-            </a:ext>
-          </a:extLst>
-        </p:spPr>
-      </p:pic>
-      <p:pic>
-        <p:nvPicPr>
-          <p:cNvPr id="17415" name="Picture 7" descr="txp_fig"/>
-          <p:cNvPicPr>
-            <a:picLocks noChangeAspect="1"/>
-          </p:cNvPicPr>
-          <p:nvPr>
-            <p:custDataLst>
-              <p:tags r:id="rId3"/>
-            </p:custDataLst>
-          </p:nvPr>
-        </p:nvPicPr>
-        <p:blipFill>
-          <a:blip r:embed="rId10" cstate="print">
-            <a:extLst>
-              <a:ext uri="{28A0092B-C50C-407E-A947-70E740481C1C}">
-                <a14:useLocalDpi xmlns:a14="http://schemas.microsoft.com/office/drawing/2010/main" val="0"/>
-              </a:ext>
-            </a:extLst>
-          </a:blip>
-          <a:srcRect/>
-          <a:stretch>
-            <a:fillRect/>
-          </a:stretch>
-        </p:blipFill>
-        <p:spPr bwMode="auto">
-          <a:xfrm>
-            <a:off x="2057400" y="6099298"/>
-            <a:ext cx="4227810" cy="273076"/>
-          </a:xfrm>
-          <a:prstGeom prst="rect">
-            <a:avLst/>
-          </a:prstGeom>
-          <a:noFill/>
-          <a:ln>
-            <a:noFill/>
-          </a:ln>
-          <a:extLst>
-            <a:ext uri="{909E8E84-426E-40dd-AFC4-6F175D3DCCD1}">
-              <a14:hiddenFill xmlns:a14="http://schemas.microsoft.com/office/drawing/2010/main" xmlns="">
-                <a:solidFill>
-                  <a:srgbClr val="FFFFFF"/>
-                </a:solidFill>
-              </a14:hiddenFill>
-            </a:ext>
-            <a:ext uri="{91240B29-F687-4f45-9708-019B960494DF}">
-              <a14:hiddenLine xmlns:a14="http://schemas.microsoft.com/office/drawing/2010/main" xmlns="" w="9525">
-                <a:solidFill>
-                  <a:srgbClr val="000000"/>
-                </a:solidFill>
-                <a:miter lim="800000"/>
-                <a:headEnd/>
-                <a:tailEnd/>
-              </a14:hiddenLine>
-            </a:ext>
-          </a:extLst>
-        </p:spPr>
-      </p:pic>
-      <p:pic>
-        <p:nvPicPr>
-          <p:cNvPr id="2" name="Picture 1" descr="txp_fig.png"/>
-          <p:cNvPicPr>
-            <a:picLocks noChangeAspect="1"/>
-          </p:cNvPicPr>
-          <p:nvPr>
-            <p:custDataLst>
-              <p:tags r:id="rId4"/>
-            </p:custDataLst>
-          </p:nvPr>
-        </p:nvPicPr>
-        <p:blipFill>
-          <a:blip r:embed="rId11" cstate="print">
-            <a:extLst>
-              <a:ext uri="{28A0092B-C50C-407E-A947-70E740481C1C}">
-                <a14:useLocalDpi xmlns:a14="http://schemas.microsoft.com/office/drawing/2010/main" val="0"/>
-              </a:ext>
-            </a:extLst>
-          </a:blip>
-          <a:stretch>
-            <a:fillRect/>
-          </a:stretch>
-        </p:blipFill>
-        <p:spPr bwMode="auto">
-          <a:xfrm>
-            <a:off x="1981200" y="3507461"/>
-            <a:ext cx="7023790" cy="1025655"/>
-          </a:xfrm>
-          <a:prstGeom prst="rect">
-            <a:avLst/>
-          </a:prstGeom>
-          <a:noFill/>
-          <a:ln w="9525" cap="flat" cmpd="sng" algn="ctr">
-            <a:noFill/>
-            <a:prstDash val="solid"/>
-            <a:round/>
-            <a:headEnd type="none" w="med" len="med"/>
-            <a:tailEnd type="none" w="med" len="med"/>
-          </a:ln>
-          <a:effectLst/>
-          <a:extLst>
-            <a:ext uri="{909E8E84-426E-40dd-AFC4-6F175D3DCCD1}">
-              <a14:hiddenFill xmlns:a14="http://schemas.microsoft.com/office/drawing/2010/main" xmlns="">
-                <a:solidFill>
-                  <a:srgbClr val="FFFFFF"/>
-                </a:solidFill>
-              </a14:hiddenFill>
-            </a:ext>
-            <a:ext uri="{91240B29-F687-4f45-9708-019B960494DF}">
-              <a14:hiddenLine xmlns:a14="http://schemas.microsoft.com/office/drawing/2010/main" xmlns="" w="9525" cap="flat" cmpd="sng" algn="ctr">
-                <a:solidFill>
-                  <a:schemeClr val="tx1"/>
-                </a:solidFill>
-                <a:prstDash val="solid"/>
-                <a:round/>
-                <a:headEnd type="none" w="med" len="med"/>
-                <a:tailEnd type="none" w="med" len="med"/>
-              </a14:hiddenLine>
-            </a:ext>
-            <a:ext uri="{AF507438-7753-43e0-B8FC-AC1667EBCBE1}">
-              <a14:hiddenEffects xmlns:a14="http://schemas.microsoft.com/office/drawing/2010/main" xmlns="">
-                <a:effectLst>
-                  <a:outerShdw blurRad="63500" dist="37357" dir="2700000" rotWithShape="0">
-                    <a:scrgbClr r="0" g="0" b="0"/>
-                  </a:outerShdw>
-                </a:effectLst>
-              </a14:hiddenEffects>
-            </a:ext>
-            <a:ext uri="{31F19639-BCED-4a60-ADC4-E9642A236FB7}">
-              <a14:hiddenScene3d xmlns:a14="http://schemas.microsoft.com/office/drawing/2010/main" xmlns="">
-                <a:camera prst="orthographicFront">
-                  <a:rot lat="0" lon="0" rev="0"/>
-                </a:camera>
-                <a:lightRig rig="threePt" dir="t">
-                  <a:rot lat="0" lon="0" rev="0"/>
-                </a:lightRig>
-              </a14:hiddenScene3d>
-            </a:ext>
-            <a:ext uri="{E45631CC-5BF2-4c18-A39C-3461C7D3F71A}">
-              <a14:hiddenSp3d xmlns:a14="http://schemas.microsoft.com/office/drawing/2010/main" xmlns="" extrusionH="457200">
-                <a:contourClr>
-                  <a:srgbClr val="000000"/>
-                </a:contourClr>
-              </a14:hiddenSp3d>
-            </a:ext>
-            <a:ext uri="{53640926-AAD7-44d8-BBD7-CCE9431645EC}">
-              <a14:shadowObscured xmlns:a14="http://schemas.microsoft.com/office/drawing/2010/main" xmlns=""/>
-            </a:ext>
-          </a:extLst>
-        </p:spPr>
-      </p:pic>
-      <p:grpSp>
-        <p:nvGrpSpPr>
-          <p:cNvPr id="8" name="Group 7">
-            <a:extLst>
-              <a:ext uri="{FF2B5EF4-FFF2-40B4-BE49-F238E27FC236}">
-                <a16:creationId xmlns:a16="http://schemas.microsoft.com/office/drawing/2014/main" id="{79990F65-3D61-AE86-4D6A-23B36D0AA4BB}"/>
-              </a:ext>
-            </a:extLst>
-          </p:cNvPr>
-          <p:cNvGrpSpPr/>
-          <p:nvPr/>
-        </p:nvGrpSpPr>
-        <p:grpSpPr>
-          <a:xfrm>
-            <a:off x="3788320" y="1926371"/>
-            <a:ext cx="3943350" cy="672704"/>
-            <a:chOff x="3752850" y="1935837"/>
-            <a:chExt cx="3943350" cy="672704"/>
-          </a:xfrm>
-        </p:grpSpPr>
-        <p:pic>
-          <p:nvPicPr>
-            <p:cNvPr id="17412" name="Picture 8" descr="txp_fig"/>
-            <p:cNvPicPr>
-              <a:picLocks noChangeAspect="1" noChangeArrowheads="1"/>
-            </p:cNvPicPr>
-            <p:nvPr>
-              <p:custDataLst>
-                <p:tags r:id="rId5"/>
-              </p:custDataLst>
-            </p:nvPr>
-          </p:nvPicPr>
-          <p:blipFill>
-            <a:blip r:embed="rId12" cstate="print">
-              <a:extLst>
-                <a:ext uri="{28A0092B-C50C-407E-A947-70E740481C1C}">
-                  <a14:useLocalDpi xmlns:a14="http://schemas.microsoft.com/office/drawing/2010/main" val="0"/>
-                </a:ext>
-              </a:extLst>
-            </a:blip>
-            <a:srcRect/>
-            <a:stretch>
-              <a:fillRect/>
-            </a:stretch>
-          </p:blipFill>
-          <p:spPr bwMode="auto">
-            <a:xfrm>
-              <a:off x="3752850" y="1935837"/>
-              <a:ext cx="2250126" cy="672704"/>
-            </a:xfrm>
-            <a:prstGeom prst="rect">
-              <a:avLst/>
-            </a:prstGeom>
-            <a:noFill/>
-            <a:ln>
-              <a:noFill/>
-            </a:ln>
-            <a:extLst>
-              <a:ext uri="{909E8E84-426E-40dd-AFC4-6F175D3DCCD1}">
-                <a14:hiddenFill xmlns:a14="http://schemas.microsoft.com/office/drawing/2010/main" xmlns="">
-                  <a:solidFill>
-                    <a:srgbClr val="FFFFFF"/>
-                  </a:solidFill>
-                </a14:hiddenFill>
-              </a:ext>
-              <a:ext uri="{91240B29-F687-4f45-9708-019B960494DF}">
-                <a14:hiddenLine xmlns:a14="http://schemas.microsoft.com/office/drawing/2010/main" xmlns="" w="9525">
-                  <a:solidFill>
-                    <a:srgbClr val="000000"/>
-                  </a:solidFill>
-                  <a:miter lim="800000"/>
-                  <a:headEnd/>
-                  <a:tailEnd/>
-                </a14:hiddenLine>
-              </a:ext>
-            </a:extLst>
-          </p:spPr>
-        </p:pic>
-        <mc:AlternateContent xmlns:mc="http://schemas.openxmlformats.org/markup-compatibility/2006">
-          <mc:Choice xmlns:a14="http://schemas.microsoft.com/office/drawing/2010/main" Requires="a14">
-            <p:sp>
-              <p:nvSpPr>
-                <p:cNvPr id="5" name="TextBox 4">
-                  <a:extLst>
-                    <a:ext uri="{FF2B5EF4-FFF2-40B4-BE49-F238E27FC236}">
-                      <a16:creationId xmlns:a16="http://schemas.microsoft.com/office/drawing/2014/main" id="{4EE783C2-B0C0-4B6C-8482-1736FD09DAD8}"/>
-                    </a:ext>
-                  </a:extLst>
-                </p:cNvPr>
-                <p:cNvSpPr txBox="1"/>
-                <p:nvPr/>
-              </p:nvSpPr>
-              <p:spPr>
-                <a:xfrm>
-                  <a:off x="6210088" y="2059661"/>
-                  <a:ext cx="1486112" cy="369332"/>
-                </a:xfrm>
-                <a:prstGeom prst="rect">
-                  <a:avLst/>
-                </a:prstGeom>
-                <a:noFill/>
-              </p:spPr>
-              <p:txBody>
-                <a:bodyPr wrap="none" lIns="0" tIns="0" rIns="0" bIns="0" rtlCol="0">
-                  <a:spAutoFit/>
-                </a:bodyPr>
-                <a:lstStyle/>
-                <a:p>
-                  <a:pPr/>
-                  <a14:m>
-                    <m:oMathPara xmlns:m="http://schemas.openxmlformats.org/officeDocument/2006/math">
-                      <m:oMathParaPr>
-                        <m:jc m:val="centerGroup"/>
-                      </m:oMathParaPr>
-                      <m:oMath xmlns:m="http://schemas.openxmlformats.org/officeDocument/2006/math">
-                        <m:r>
-                          <a:rPr lang="en-US" sz="2400" b="0" i="1" smtClean="0">
-                            <a:latin typeface="Cambria Math" panose="02040503050406030204" pitchFamily="18" charset="0"/>
-                          </a:rPr>
-                          <m:t>=</m:t>
-                        </m:r>
-                        <m:r>
-                          <a:rPr lang="en-US" sz="2400" b="0" i="1" smtClean="0">
-                            <a:latin typeface="Cambria Math" panose="02040503050406030204" pitchFamily="18" charset="0"/>
-                          </a:rPr>
-                          <m:t>𝛼</m:t>
-                        </m:r>
-                        <m:r>
-                          <a:rPr lang="en-US" sz="2400" b="0" i="1" smtClean="0">
-                            <a:latin typeface="Cambria Math" panose="02040503050406030204" pitchFamily="18" charset="0"/>
-                          </a:rPr>
-                          <m:t>𝑃</m:t>
-                        </m:r>
-                        <m:r>
-                          <a:rPr lang="en-US" sz="2400" b="0" i="1" smtClean="0">
-                            <a:latin typeface="Cambria Math" panose="02040503050406030204" pitchFamily="18" charset="0"/>
-                          </a:rPr>
-                          <m:t>(</m:t>
-                        </m:r>
-                        <m:r>
-                          <a:rPr lang="en-US" sz="2400" b="0" i="1" smtClean="0">
-                            <a:latin typeface="Cambria Math" panose="02040503050406030204" pitchFamily="18" charset="0"/>
-                          </a:rPr>
-                          <m:t>𝑥</m:t>
-                        </m:r>
-                        <m:r>
-                          <a:rPr lang="en-US" sz="2400" b="0" i="1" smtClean="0">
-                            <a:latin typeface="Cambria Math" panose="02040503050406030204" pitchFamily="18" charset="0"/>
-                          </a:rPr>
-                          <m:t>,</m:t>
-                        </m:r>
-                        <m:r>
-                          <a:rPr lang="en-US" sz="2400" b="0" i="1" smtClean="0">
-                            <a:latin typeface="Cambria Math" panose="02040503050406030204" pitchFamily="18" charset="0"/>
-                          </a:rPr>
-                          <m:t>𝑦</m:t>
-                        </m:r>
-                        <m:r>
-                          <a:rPr lang="en-US" sz="2400" b="0" i="1" smtClean="0">
-                            <a:latin typeface="Cambria Math" panose="02040503050406030204" pitchFamily="18" charset="0"/>
-                          </a:rPr>
-                          <m:t>)</m:t>
-                        </m:r>
-                      </m:oMath>
-                    </m:oMathPara>
-                  </a14:m>
-                  <a:endParaRPr lang="en-US" sz="2400" dirty="0"/>
-                </a:p>
-              </p:txBody>
-            </p:sp>
-          </mc:Choice>
-          <mc:Fallback>
-            <p:sp>
-              <p:nvSpPr>
-                <p:cNvPr id="5" name="TextBox 4">
-                  <a:extLst>
-                    <a:ext uri="{FF2B5EF4-FFF2-40B4-BE49-F238E27FC236}">
-                      <a16:creationId xmlns:a16="http://schemas.microsoft.com/office/drawing/2014/main" id="{4EE783C2-B0C0-4B6C-8482-1736FD09DAD8}"/>
-                    </a:ext>
-                  </a:extLst>
-                </p:cNvPr>
-                <p:cNvSpPr txBox="1">
-                  <a:spLocks noRot="1" noChangeAspect="1" noMove="1" noResize="1" noEditPoints="1" noAdjustHandles="1" noChangeArrowheads="1" noChangeShapeType="1" noTextEdit="1"/>
-                </p:cNvSpPr>
-                <p:nvPr/>
-              </p:nvSpPr>
-              <p:spPr>
-                <a:xfrm>
-                  <a:off x="6210088" y="2059661"/>
-                  <a:ext cx="1486112" cy="369332"/>
-                </a:xfrm>
-                <a:prstGeom prst="rect">
-                  <a:avLst/>
-                </a:prstGeom>
-                <a:blipFill>
-                  <a:blip r:embed="rId13"/>
-                  <a:stretch>
-                    <a:fillRect l="-1646" r="-6996" b="-34426"/>
-                  </a:stretch>
-                </a:blipFill>
-              </p:spPr>
-              <p:txBody>
-                <a:bodyPr/>
-                <a:lstStyle/>
-                <a:p>
-                  <a:r>
-                    <a:rPr lang="en-US">
-                      <a:noFill/>
-                    </a:rPr>
-                    <a:t> </a:t>
-                  </a:r>
-                </a:p>
-              </p:txBody>
-            </p:sp>
-          </mc:Fallback>
-        </mc:AlternateContent>
-      </p:grpSp>
-      <mc:AlternateContent xmlns:mc="http://schemas.openxmlformats.org/markup-compatibility/2006">
-        <mc:Choice xmlns:a14="http://schemas.microsoft.com/office/drawing/2010/main" Requires="a14">
-          <p:sp>
-            <p:nvSpPr>
-              <p:cNvPr id="6" name="TextBox 5">
-                <a:extLst>
-                  <a:ext uri="{FF2B5EF4-FFF2-40B4-BE49-F238E27FC236}">
-                    <a16:creationId xmlns:a16="http://schemas.microsoft.com/office/drawing/2014/main" id="{DA4BF9ED-169D-80CA-6B58-98047FE0D351}"/>
-                  </a:ext>
-                </a:extLst>
-              </p:cNvPr>
-              <p:cNvSpPr txBox="1"/>
-              <p:nvPr/>
-            </p:nvSpPr>
-            <p:spPr>
-              <a:xfrm>
-                <a:off x="6664809" y="5235821"/>
-                <a:ext cx="2032000" cy="400110"/>
-              </a:xfrm>
-              <a:prstGeom prst="rect">
-                <a:avLst/>
-              </a:prstGeom>
-              <a:noFill/>
-            </p:spPr>
-            <p:txBody>
-              <a:bodyPr wrap="square" rtlCol="0">
-                <a:spAutoFit/>
-              </a:bodyPr>
-              <a:lstStyle/>
-              <a:p>
-                <a:r>
-                  <a:rPr lang="en-US" sz="2000" dirty="0"/>
-                  <a:t>Written as </a:t>
-                </a:r>
-                <a14:m>
-                  <m:oMath xmlns:m="http://schemas.openxmlformats.org/officeDocument/2006/math">
-                    <m:r>
-                      <a:rPr lang="en-US" sz="2000" b="0" i="1" smtClean="0">
-                        <a:latin typeface="Cambria Math" panose="02040503050406030204" pitchFamily="18" charset="0"/>
-                      </a:rPr>
-                      <m:t>𝑋</m:t>
-                    </m:r>
-                    <m:r>
-                      <a:rPr lang="en-US" sz="2000" b="0" i="1" smtClean="0">
-                        <a:latin typeface="Cambria Math" panose="02040503050406030204" pitchFamily="18" charset="0"/>
-                      </a:rPr>
-                      <m:t>⫫</m:t>
-                    </m:r>
-                    <m:r>
-                      <a:rPr lang="en-US" sz="2000" b="0" i="1" smtClean="0">
-                        <a:latin typeface="Cambria Math" panose="02040503050406030204" pitchFamily="18" charset="0"/>
-                      </a:rPr>
-                      <m:t>𝑌</m:t>
-                    </m:r>
-                    <m:r>
-                      <m:rPr>
-                        <m:nor/>
-                      </m:rPr>
-                      <a:rPr lang="en-US" sz="2000" b="0" i="0" smtClean="0"/>
-                      <m:t> </m:t>
-                    </m:r>
-                  </m:oMath>
-                </a14:m>
-                <a:endParaRPr lang="en-US" sz="2000" dirty="0"/>
-              </a:p>
-            </p:txBody>
-          </p:sp>
-        </mc:Choice>
-        <mc:Fallback>
-          <p:sp>
-            <p:nvSpPr>
-              <p:cNvPr id="6" name="TextBox 5">
-                <a:extLst>
-                  <a:ext uri="{FF2B5EF4-FFF2-40B4-BE49-F238E27FC236}">
-                    <a16:creationId xmlns:a16="http://schemas.microsoft.com/office/drawing/2014/main" id="{DA4BF9ED-169D-80CA-6B58-98047FE0D351}"/>
-                  </a:ext>
-                </a:extLst>
-              </p:cNvPr>
-              <p:cNvSpPr txBox="1">
-                <a:spLocks noRot="1" noChangeAspect="1" noMove="1" noResize="1" noEditPoints="1" noAdjustHandles="1" noChangeArrowheads="1" noChangeShapeType="1" noTextEdit="1"/>
-              </p:cNvSpPr>
-              <p:nvPr/>
-            </p:nvSpPr>
-            <p:spPr>
-              <a:xfrm>
-                <a:off x="6664809" y="5235821"/>
-                <a:ext cx="2032000" cy="400110"/>
-              </a:xfrm>
-              <a:prstGeom prst="rect">
-                <a:avLst/>
-              </a:prstGeom>
-              <a:blipFill>
-                <a:blip r:embed="rId14"/>
-                <a:stretch>
-                  <a:fillRect l="-2994" t="-9091" b="-25758"/>
-                </a:stretch>
-              </a:blipFill>
-            </p:spPr>
-            <p:txBody>
-              <a:bodyPr/>
-              <a:lstStyle/>
-              <a:p>
-                <a:r>
-                  <a:rPr lang="en-US">
-                    <a:noFill/>
-                  </a:rPr>
-                  <a:t> </a:t>
-                </a:r>
-              </a:p>
-            </p:txBody>
-          </p:sp>
-        </mc:Fallback>
-      </mc:AlternateContent>
-      <mc:AlternateContent xmlns:mc="http://schemas.openxmlformats.org/markup-compatibility/2006">
-        <mc:Choice xmlns:a14="http://schemas.microsoft.com/office/drawing/2010/main" Requires="a14">
-          <p:sp>
-            <p:nvSpPr>
-              <p:cNvPr id="7" name="TextBox 6">
-                <a:extLst>
-                  <a:ext uri="{FF2B5EF4-FFF2-40B4-BE49-F238E27FC236}">
-                    <a16:creationId xmlns:a16="http://schemas.microsoft.com/office/drawing/2014/main" id="{993D370C-1488-81EF-AB09-75B5CD5870EC}"/>
-                  </a:ext>
-                </a:extLst>
-              </p:cNvPr>
-              <p:cNvSpPr txBox="1"/>
-              <p:nvPr/>
-            </p:nvSpPr>
-            <p:spPr>
-              <a:xfrm>
-                <a:off x="6512409" y="6023724"/>
-                <a:ext cx="2336800" cy="400110"/>
-              </a:xfrm>
-              <a:prstGeom prst="rect">
-                <a:avLst/>
-              </a:prstGeom>
-              <a:noFill/>
-            </p:spPr>
-            <p:txBody>
-              <a:bodyPr wrap="square" rtlCol="0">
-                <a:spAutoFit/>
-              </a:bodyPr>
-              <a:lstStyle/>
-              <a:p>
-                <a:r>
-                  <a:rPr lang="en-US" sz="2000" dirty="0"/>
-                  <a:t>Written as </a:t>
-                </a:r>
-                <a14:m>
-                  <m:oMath xmlns:m="http://schemas.openxmlformats.org/officeDocument/2006/math">
-                    <m:r>
-                      <a:rPr lang="en-US" sz="2000" b="0" i="1" smtClean="0">
-                        <a:latin typeface="Cambria Math" panose="02040503050406030204" pitchFamily="18" charset="0"/>
-                      </a:rPr>
-                      <m:t>𝑋</m:t>
-                    </m:r>
-                    <m:r>
-                      <a:rPr lang="en-US" sz="2000" b="0" i="1" smtClean="0">
-                        <a:latin typeface="Cambria Math" panose="02040503050406030204" pitchFamily="18" charset="0"/>
-                      </a:rPr>
-                      <m:t>⫫</m:t>
-                    </m:r>
-                    <m:r>
-                      <a:rPr lang="en-US" sz="2000" b="0" i="1" smtClean="0">
-                        <a:latin typeface="Cambria Math" panose="02040503050406030204" pitchFamily="18" charset="0"/>
-                      </a:rPr>
-                      <m:t>𝑌</m:t>
-                    </m:r>
-                    <m:r>
-                      <a:rPr lang="en-US" sz="2000" b="0" i="1" smtClean="0">
-                        <a:latin typeface="Cambria Math" panose="02040503050406030204" pitchFamily="18" charset="0"/>
-                      </a:rPr>
-                      <m:t>|</m:t>
-                    </m:r>
-                    <m:r>
-                      <a:rPr lang="en-US" sz="2000" b="0" i="1" smtClean="0">
-                        <a:latin typeface="Cambria Math" panose="02040503050406030204" pitchFamily="18" charset="0"/>
-                      </a:rPr>
-                      <m:t>𝑍</m:t>
-                    </m:r>
-                    <m:r>
-                      <m:rPr>
-                        <m:nor/>
-                      </m:rPr>
-                      <a:rPr lang="en-US" sz="2000" b="0" i="0" smtClean="0"/>
-                      <m:t> </m:t>
-                    </m:r>
-                  </m:oMath>
-                </a14:m>
-                <a:endParaRPr lang="en-US" sz="2000" dirty="0"/>
-              </a:p>
-            </p:txBody>
-          </p:sp>
-        </mc:Choice>
-        <mc:Fallback>
-          <p:sp>
-            <p:nvSpPr>
-              <p:cNvPr id="7" name="TextBox 6">
-                <a:extLst>
-                  <a:ext uri="{FF2B5EF4-FFF2-40B4-BE49-F238E27FC236}">
-                    <a16:creationId xmlns:a16="http://schemas.microsoft.com/office/drawing/2014/main" id="{993D370C-1488-81EF-AB09-75B5CD5870EC}"/>
-                  </a:ext>
-                </a:extLst>
-              </p:cNvPr>
-              <p:cNvSpPr txBox="1">
-                <a:spLocks noRot="1" noChangeAspect="1" noMove="1" noResize="1" noEditPoints="1" noAdjustHandles="1" noChangeArrowheads="1" noChangeShapeType="1" noTextEdit="1"/>
-              </p:cNvSpPr>
-              <p:nvPr/>
-            </p:nvSpPr>
-            <p:spPr>
-              <a:xfrm>
-                <a:off x="6512409" y="6023724"/>
-                <a:ext cx="2336800" cy="400110"/>
-              </a:xfrm>
-              <a:prstGeom prst="rect">
-                <a:avLst/>
-              </a:prstGeom>
-              <a:blipFill>
-                <a:blip r:embed="rId15"/>
-                <a:stretch>
-                  <a:fillRect l="-2604" t="-7576" b="-25758"/>
+                  <a:fillRect l="-464" t="-1340"/>
                 </a:stretch>
               </a:blipFill>
             </p:spPr>
@@ -22724,6 +23465,11 @@
         </mc:Fallback>
       </mc:AlternateContent>
     </p:spTree>
+    <p:extLst>
+      <p:ext uri="{BB962C8B-B14F-4D97-AF65-F5344CB8AC3E}">
+        <p14:creationId xmlns:p14="http://schemas.microsoft.com/office/powerpoint/2010/main" val="4197618171"/>
+      </p:ext>
+    </p:extLst>
   </p:cSld>
   <p:clrMapOvr>
     <a:masterClrMapping/>
@@ -23567,8 +24313,8 @@
           </a:p>
         </p:txBody>
       </p:sp>
-      <mc:AlternateContent xmlns:mc="http://schemas.openxmlformats.org/markup-compatibility/2006">
-        <mc:Choice xmlns:a14="http://schemas.microsoft.com/office/drawing/2010/main" Requires="a14">
+      <mc:AlternateContent xmlns:mc="http://schemas.openxmlformats.org/markup-compatibility/2006" xmlns:a14="http://schemas.microsoft.com/office/drawing/2010/main">
+        <mc:Choice Requires="a14">
           <p:sp>
             <p:nvSpPr>
               <p:cNvPr id="3" name="Content Placeholder 2"/>
@@ -23892,7 +24638,7 @@
             </p:txBody>
           </p:sp>
         </mc:Choice>
-        <mc:Fallback>
+        <mc:Fallback xmlns="">
           <p:sp>
             <p:nvSpPr>
               <p:cNvPr id="3" name="Content Placeholder 2"/>
@@ -24403,8 +25149,8 @@
           </a:p>
         </p:txBody>
       </p:sp>
-      <mc:AlternateContent xmlns:mc="http://schemas.openxmlformats.org/markup-compatibility/2006">
-        <mc:Choice xmlns:a14="http://schemas.microsoft.com/office/drawing/2010/main" Requires="a14">
+      <mc:AlternateContent xmlns:mc="http://schemas.openxmlformats.org/markup-compatibility/2006" xmlns:a14="http://schemas.microsoft.com/office/drawing/2010/main">
+        <mc:Choice Requires="a14">
           <p:sp>
             <p:nvSpPr>
               <p:cNvPr id="3" name="Content Placeholder 2"/>
@@ -24589,7 +25335,7 @@
             </p:txBody>
           </p:sp>
         </mc:Choice>
-        <mc:Fallback>
+        <mc:Fallback xmlns="">
           <p:sp>
             <p:nvSpPr>
               <p:cNvPr id="3" name="Content Placeholder 2"/>
@@ -31054,8 +31800,8 @@
           </a:p>
         </p:txBody>
       </p:sp>
-      <mc:AlternateContent xmlns:mc="http://schemas.openxmlformats.org/markup-compatibility/2006">
-        <mc:Choice xmlns:a14="http://schemas.microsoft.com/office/drawing/2010/main" Requires="a14">
+      <mc:AlternateContent xmlns:mc="http://schemas.openxmlformats.org/markup-compatibility/2006" xmlns:a14="http://schemas.microsoft.com/office/drawing/2010/main">
+        <mc:Choice Requires="a14">
           <p:sp>
             <p:nvSpPr>
               <p:cNvPr id="3" name="Content Placeholder 2"/>
@@ -31541,7 +32287,7 @@
             </p:txBody>
           </p:sp>
         </mc:Choice>
-        <mc:Fallback>
+        <mc:Fallback xmlns="">
           <p:sp>
             <p:nvSpPr>
               <p:cNvPr id="3" name="Content Placeholder 2"/>
@@ -35516,8 +36262,8 @@
           </a:p>
         </p:txBody>
       </p:sp>
-      <mc:AlternateContent xmlns:mc="http://schemas.openxmlformats.org/markup-compatibility/2006">
-        <mc:Choice xmlns:a14="http://schemas.microsoft.com/office/drawing/2010/main" Requires="a14">
+      <mc:AlternateContent xmlns:mc="http://schemas.openxmlformats.org/markup-compatibility/2006" xmlns:a14="http://schemas.microsoft.com/office/drawing/2010/main">
+        <mc:Choice Requires="a14">
           <p:sp>
             <p:nvSpPr>
               <p:cNvPr id="3" name="Content Placeholder 2"/>
@@ -35864,7 +36610,7 @@
             </p:txBody>
           </p:sp>
         </mc:Choice>
-        <mc:Fallback>
+        <mc:Fallback xmlns="">
           <p:sp>
             <p:nvSpPr>
               <p:cNvPr id="3" name="Content Placeholder 2"/>
@@ -36281,8 +37027,8 @@
           </a:p>
         </p:txBody>
       </p:sp>
-      <mc:AlternateContent xmlns:mc="http://schemas.openxmlformats.org/markup-compatibility/2006">
-        <mc:Choice xmlns:a14="http://schemas.microsoft.com/office/drawing/2010/main" Requires="a14">
+      <mc:AlternateContent xmlns:mc="http://schemas.openxmlformats.org/markup-compatibility/2006" xmlns:a14="http://schemas.microsoft.com/office/drawing/2010/main">
+        <mc:Choice Requires="a14">
           <p:sp>
             <p:nvSpPr>
               <p:cNvPr id="19" name="Content Placeholder 18"/>
@@ -36411,7 +37157,7 @@
             </p:txBody>
           </p:sp>
         </mc:Choice>
-        <mc:Fallback>
+        <mc:Fallback xmlns="">
           <p:sp>
             <p:nvSpPr>
               <p:cNvPr id="19" name="Content Placeholder 18"/>
@@ -36855,8 +37601,8 @@
           </p:style>
         </p:cxnSp>
       </p:grpSp>
-      <mc:AlternateContent xmlns:mc="http://schemas.openxmlformats.org/markup-compatibility/2006">
-        <mc:Choice xmlns:a14="http://schemas.microsoft.com/office/drawing/2010/main" Requires="a14">
+      <mc:AlternateContent xmlns:mc="http://schemas.openxmlformats.org/markup-compatibility/2006" xmlns:a14="http://schemas.microsoft.com/office/drawing/2010/main">
+        <mc:Choice Requires="a14">
           <p:sp>
             <p:nvSpPr>
               <p:cNvPr id="11" name="TextBox 10">
@@ -37193,7 +37939,7 @@
             </p:txBody>
           </p:sp>
         </mc:Choice>
-        <mc:Fallback>
+        <mc:Fallback xmlns="">
           <p:sp>
             <p:nvSpPr>
               <p:cNvPr id="11" name="TextBox 10">
@@ -37426,98 +38172,6 @@
     <a:masterClrMapping/>
   </p:clrMapOvr>
 </p:sld>
-</file>
-
-<file path=ppt/tags/tag1.xml><?xml version="1.0" encoding="utf-8"?>
-<p:tagLst xmlns:a="http://schemas.openxmlformats.org/drawingml/2006/main" xmlns:r="http://schemas.openxmlformats.org/officeDocument/2006/relationships" xmlns:p="http://schemas.openxmlformats.org/presentationml/2006/main">
-  <p:tag name="SOURCE" val="\documentclass{slides}\pagestyle{empty}&#10;\begin{document}&#10;\[&#10;P(x, y) = P(x | y) P(y)&#10;\]&#10;\end{document}&#10;"/>
-  <p:tag name="EXTERNALNAME" val="txp_fig"/>
-  <p:tag name="BLEND" val="False"/>
-  <p:tag name="TRANSPARENT" val="False"/>
-  <p:tag name="KEEPFILES" val="False"/>
-  <p:tag name="DEBUGPAUSE" val="False"/>
-  <p:tag name="RESOLUTION" val="1200"/>
-  <p:tag name="TIMEOUT" val="(none)"/>
-  <p:tag name="BOXWIDTH" val="385"/>
-  <p:tag name="BOXHEIGHT" val="283"/>
-  <p:tag name="BOXFONT" val="10"/>
-  <p:tag name="BOXWRAP" val="False"/>
-  <p:tag name="WORKAROUNDTRANSPARENCYBUG" val="False"/>
-  <p:tag name="ALLOWFONTSUBSTITUTION" val="False"/>
-  <p:tag name="BITMAPFORMAT" val="pngmono"/>
-  <p:tag name="ORIGWIDTH" val="208"/>
-  <p:tag name="PICTUREFILESIZE" val="10456"/>
-</p:tagLst>
-</file>
-
-<file path=ppt/tags/tag2.xml><?xml version="1.0" encoding="utf-8"?>
-<p:tagLst xmlns:a="http://schemas.openxmlformats.org/drawingml/2006/main" xmlns:r="http://schemas.openxmlformats.org/officeDocument/2006/relationships" xmlns:p="http://schemas.openxmlformats.org/presentationml/2006/main">
-  <p:tag name="TEXPOINT" val="latex"/>
-  <p:tag name="SOURCE" val="\documentclass{slides}\pagestyle{empty}&#10;\begin{document}&#10;\[&#10;\forall x,y: P(x, y) = P(x) P(y)&#10;\]&#10;\end{document}&#10;"/>
-  <p:tag name="FILENAME" val="txp_fig"/>
-  <p:tag name="FORMAT" val="pngmono"/>
-  <p:tag name="RES" val="1200"/>
-  <p:tag name="BLEND" val="0"/>
-  <p:tag name="TRANSPARENT" val="0"/>
-  <p:tag name="TBUG" val="0"/>
-  <p:tag name="ALLOWFS" val="0"/>
-  <p:tag name="ORIGWIDTH" val="254"/>
-  <p:tag name="PICTUREFILESIZE" val="12424"/>
-</p:tagLst>
-</file>
-
-<file path=ppt/tags/tag3.xml><?xml version="1.0" encoding="utf-8"?>
-<p:tagLst xmlns:a="http://schemas.openxmlformats.org/drawingml/2006/main" xmlns:r="http://schemas.openxmlformats.org/officeDocument/2006/relationships" xmlns:p="http://schemas.openxmlformats.org/presentationml/2006/main">
-  <p:tag name="TEXPOINT" val="latex"/>
-  <p:tag name="SOURCE" val="\documentclass{slides}\pagestyle{empty}&#10;\begin{document}&#10;\[&#10;\forall x,y,z : P(x, y | z) = P(x | z) P(y | z)&#10;\]&#10;\end{document}&#10;"/>
-  <p:tag name="FILENAME" val="txp_fig"/>
-  <p:tag name="FORMAT" val="pngmono"/>
-  <p:tag name="RES" val="1200"/>
-  <p:tag name="BLEND" val="0"/>
-  <p:tag name="TRANSPARENT" val="0"/>
-  <p:tag name="TBUG" val="0"/>
-  <p:tag name="ALLOWFS" val="0"/>
-  <p:tag name="ORIGWIDTH" val="324"/>
-  <p:tag name="PICTUREFILESIZE" val="17943"/>
-</p:tagLst>
-</file>
-
-<file path=ppt/tags/tag4.xml><?xml version="1.0" encoding="utf-8"?>
-<p:tagLst xmlns:a="http://schemas.openxmlformats.org/drawingml/2006/main" xmlns:r="http://schemas.openxmlformats.org/officeDocument/2006/relationships" xmlns:p="http://schemas.openxmlformats.org/presentationml/2006/main">
-  <p:tag name="TEXPOINT" val="latex"/>
-  <p:tag name="SOURCE" val="\documentclass{slides}\pagestyle{empty}&#10;\begin{document}&#10;\begin{eqnarray*}&#10;P(X_1, X_2, \ldots X_n) &amp; = &amp; P(X_1) P(X_2 | X_1) P(X_3|X_1,X_2) \ldots \\&#10;&amp; = &amp; \prod_{i=1}^n P(X_i | X_1, \ldots, X_{i-1})&#10;\end{eqnarray*}&#10;\end{document}&#10;"/>
-  <p:tag name="FILENAME" val="txp_fig"/>
-  <p:tag name="FORMAT" val="pngmono"/>
-  <p:tag name="RES" val="1200"/>
-  <p:tag name="BLEND" val="0"/>
-  <p:tag name="TRANSPARENT" val="0"/>
-  <p:tag name="TBUG" val="0"/>
-  <p:tag name="ALLOWFS" val="0"/>
-  <p:tag name="ORIGWIDTH" val="541"/>
-  <p:tag name="PICTUREFILESIZE" val="41291"/>
-</p:tagLst>
-</file>
-
-<file path=ppt/tags/tag5.xml><?xml version="1.0" encoding="utf-8"?>
-<p:tagLst xmlns:a="http://schemas.openxmlformats.org/drawingml/2006/main" xmlns:r="http://schemas.openxmlformats.org/officeDocument/2006/relationships" xmlns:p="http://schemas.openxmlformats.org/presentationml/2006/main">
-  <p:tag name="SOURCE" val="\documentclass{slides}\pagestyle{empty}&#10;\begin{document}&#10;\[&#10;P(x | y) = \frac{P(x, y)}{P(y)}&#10;\]&#10;\end{document}&#10;"/>
-  <p:tag name="EXTERNALNAME" val="txp_fig"/>
-  <p:tag name="BLEND" val="False"/>
-  <p:tag name="TRANSPARENT" val="False"/>
-  <p:tag name="KEEPFILES" val="False"/>
-  <p:tag name="DEBUGPAUSE" val="False"/>
-  <p:tag name="RESOLUTION" val="1200"/>
-  <p:tag name="TIMEOUT" val="(none)"/>
-  <p:tag name="BOXWIDTH" val="385"/>
-  <p:tag name="BOXHEIGHT" val="283"/>
-  <p:tag name="BOXFONT" val="10"/>
-  <p:tag name="BOXWRAP" val="False"/>
-  <p:tag name="WORKAROUNDTRANSPARENCYBUG" val="False"/>
-  <p:tag name="ALLOWFONTSUBSTITUTION" val="False"/>
-  <p:tag name="BITMAPFORMAT" val="pngmono"/>
-  <p:tag name="ORIGWIDTH" val="164"/>
-  <p:tag name="PICTUREFILESIZE" val="13149"/>
-</p:tagLst>
 </file>
 
 <file path=ppt/theme/theme1.xml><?xml version="1.0" encoding="utf-8"?>

</xml_diff>

<commit_message>
added discussion slides and improve 12.
</commit_message>
<xml_diff>
--- a/slides/13_bayes_nets.pptx
+++ b/slides/13_bayes_nets.pptx
@@ -9281,7 +9281,7 @@
             <a:fld id="{71CA99E0-E95C-4F1B-B0F2-4565A2B40149}" type="datetimeFigureOut">
               <a:rPr lang="en-US" smtClean="0"/>
               <a:pPr/>
-              <a:t>6/9/2025</a:t>
+              <a:t>11/13/2025</a:t>
             </a:fld>
             <a:endParaRPr lang="en-US"/>
           </a:p>
@@ -20568,8 +20568,8 @@
           </a:p>
         </p:txBody>
       </p:sp>
-      <mc:AlternateContent xmlns:mc="http://schemas.openxmlformats.org/markup-compatibility/2006">
-        <mc:Choice xmlns:a14="http://schemas.microsoft.com/office/drawing/2010/main" Requires="a14">
+      <mc:AlternateContent xmlns:mc="http://schemas.openxmlformats.org/markup-compatibility/2006" xmlns:a14="http://schemas.microsoft.com/office/drawing/2010/main">
+        <mc:Choice Requires="a14">
           <p:sp>
             <p:nvSpPr>
               <p:cNvPr id="5123" name="Rectangle 3"/>
@@ -20719,7 +20719,7 @@
             </p:txBody>
           </p:sp>
         </mc:Choice>
-        <mc:Fallback>
+        <mc:Fallback xmlns="">
           <p:sp>
             <p:nvSpPr>
               <p:cNvPr id="5123" name="Rectangle 3"/>
@@ -21431,8 +21431,8 @@
               </a:p>
             </p:txBody>
           </p:sp>
-          <mc:AlternateContent xmlns:mc="http://schemas.openxmlformats.org/markup-compatibility/2006">
-            <mc:Choice xmlns:a14="http://schemas.microsoft.com/office/drawing/2010/main" Requires="a14">
+          <mc:AlternateContent xmlns:mc="http://schemas.openxmlformats.org/markup-compatibility/2006" xmlns:a14="http://schemas.microsoft.com/office/drawing/2010/main">
+            <mc:Choice Requires="a14">
               <p:sp>
                 <p:nvSpPr>
                   <p:cNvPr id="23" name="Rectangle 22"/>
@@ -21566,7 +21566,7 @@
                 </p:txBody>
               </p:sp>
             </mc:Choice>
-            <mc:Fallback>
+            <mc:Fallback xmlns="">
               <p:sp>
                 <p:nvSpPr>
                   <p:cNvPr id="23" name="Rectangle 22"/>
@@ -21913,8 +21913,8 @@
           </a:p>
         </p:txBody>
       </p:sp>
-      <mc:AlternateContent xmlns:mc="http://schemas.openxmlformats.org/markup-compatibility/2006">
-        <mc:Choice xmlns:a14="http://schemas.microsoft.com/office/drawing/2010/main" Requires="a14">
+      <mc:AlternateContent xmlns:mc="http://schemas.openxmlformats.org/markup-compatibility/2006" xmlns:a14="http://schemas.microsoft.com/office/drawing/2010/main">
+        <mc:Choice Requires="a14">
           <p:sp>
             <p:nvSpPr>
               <p:cNvPr id="10243" name="Rectangle 3"/>
@@ -22530,7 +22530,7 @@
             </p:txBody>
           </p:sp>
         </mc:Choice>
-        <mc:Fallback>
+        <mc:Fallback xmlns="">
           <p:sp>
             <p:nvSpPr>
               <p:cNvPr id="10243" name="Rectangle 3"/>
@@ -22758,8 +22758,8 @@
             </a:p>
           </p:txBody>
         </p:sp>
-        <mc:AlternateContent xmlns:mc="http://schemas.openxmlformats.org/markup-compatibility/2006">
-          <mc:Choice xmlns:a14="http://schemas.microsoft.com/office/drawing/2010/main" Requires="a14">
+        <mc:AlternateContent xmlns:mc="http://schemas.openxmlformats.org/markup-compatibility/2006" xmlns:a14="http://schemas.microsoft.com/office/drawing/2010/main">
+          <mc:Choice Requires="a14">
             <p:sp>
               <p:nvSpPr>
                 <p:cNvPr id="10" name="TextBox 9">
@@ -23045,7 +23045,7 @@
               </p:txBody>
             </p:sp>
           </mc:Choice>
-          <mc:Fallback>
+          <mc:Fallback xmlns="">
             <p:sp>
               <p:nvSpPr>
                 <p:cNvPr id="10" name="TextBox 9">
@@ -23653,19 +23653,67 @@
                       <a:srgbClr val="FF0000"/>
                     </a:solidFill>
                   </a:rPr>
-                  <a:t>This reduces the space complexity from exponential to linear in </a:t>
+                  <a:t>This reduces the space complexity from </a:t>
                 </a:r>
                 <a14:m>
                   <m:oMath xmlns:m="http://schemas.openxmlformats.org/officeDocument/2006/math">
                     <m:r>
-                      <a:rPr lang="en-US" sz="1600" b="1" i="1" dirty="0" smtClean="0">
+                      <a:rPr lang="en-US" sz="1600" b="1" i="1">
                         <a:solidFill>
                           <a:srgbClr val="FF0000"/>
                         </a:solidFill>
                         <a:latin typeface="Cambria Math" panose="02040503050406030204" pitchFamily="18" charset="0"/>
                       </a:rPr>
-                      <m:t>𝒏</m:t>
+                      <m:t>𝑶</m:t>
                     </m:r>
+                    <m:d>
+                      <m:dPr>
+                        <m:ctrlPr>
+                          <a:rPr lang="en-US" sz="1600" b="1" i="1">
+                            <a:solidFill>
+                              <a:srgbClr val="FF0000"/>
+                            </a:solidFill>
+                            <a:latin typeface="Cambria Math" panose="02040503050406030204" pitchFamily="18" charset="0"/>
+                          </a:rPr>
+                        </m:ctrlPr>
+                      </m:dPr>
+                      <m:e>
+                        <m:sSup>
+                          <m:sSupPr>
+                            <m:ctrlPr>
+                              <a:rPr lang="en-US" sz="1600" b="1" i="1">
+                                <a:solidFill>
+                                  <a:srgbClr val="FF0000"/>
+                                </a:solidFill>
+                                <a:latin typeface="Cambria Math" panose="02040503050406030204" pitchFamily="18" charset="0"/>
+                              </a:rPr>
+                            </m:ctrlPr>
+                          </m:sSupPr>
+                          <m:e>
+                            <m:r>
+                              <a:rPr lang="en-US" sz="1600" b="1" i="1">
+                                <a:solidFill>
+                                  <a:srgbClr val="FF0000"/>
+                                </a:solidFill>
+                                <a:latin typeface="Cambria Math" panose="02040503050406030204" pitchFamily="18" charset="0"/>
+                              </a:rPr>
+                              <m:t>𝟐</m:t>
+                            </m:r>
+                          </m:e>
+                          <m:sup>
+                            <m:r>
+                              <a:rPr lang="en-US" sz="1600" b="1" i="1">
+                                <a:solidFill>
+                                  <a:srgbClr val="FF0000"/>
+                                </a:solidFill>
+                                <a:latin typeface="Cambria Math" panose="02040503050406030204" pitchFamily="18" charset="0"/>
+                              </a:rPr>
+                              <m:t>𝒏</m:t>
+                            </m:r>
+                          </m:sup>
+                        </m:sSup>
+                      </m:e>
+                    </m:d>
                   </m:oMath>
                 </a14:m>
                 <a:r>
@@ -23674,7 +23722,51 @@
                       <a:srgbClr val="FF0000"/>
                     </a:solidFill>
                   </a:rPr>
-                  <a:t> and makes it very compact!</a:t>
+                  <a:t> to </a:t>
+                </a:r>
+                <a14:m>
+                  <m:oMath xmlns:m="http://schemas.openxmlformats.org/officeDocument/2006/math">
+                    <m:r>
+                      <a:rPr lang="en-US" sz="1600" b="1" i="1">
+                        <a:solidFill>
+                          <a:srgbClr val="FF0000"/>
+                        </a:solidFill>
+                        <a:latin typeface="Cambria Math" panose="02040503050406030204" pitchFamily="18" charset="0"/>
+                      </a:rPr>
+                      <m:t>𝑶</m:t>
+                    </m:r>
+                    <m:d>
+                      <m:dPr>
+                        <m:ctrlPr>
+                          <a:rPr lang="en-US" sz="1600" b="1" i="1">
+                            <a:solidFill>
+                              <a:srgbClr val="FF0000"/>
+                            </a:solidFill>
+                            <a:latin typeface="Cambria Math" panose="02040503050406030204" pitchFamily="18" charset="0"/>
+                          </a:rPr>
+                        </m:ctrlPr>
+                      </m:dPr>
+                      <m:e>
+                        <m:r>
+                          <a:rPr lang="en-US" sz="1600" b="1" i="1">
+                            <a:solidFill>
+                              <a:srgbClr val="FF0000"/>
+                            </a:solidFill>
+                            <a:latin typeface="Cambria Math" panose="02040503050406030204" pitchFamily="18" charset="0"/>
+                          </a:rPr>
+                          <m:t>𝒏</m:t>
+                        </m:r>
+                      </m:e>
+                    </m:d>
+                  </m:oMath>
+                </a14:m>
+                <a:r>
+                  <a:rPr lang="en-US" sz="1600" b="1" dirty="0">
+                    <a:solidFill>
+                      <a:srgbClr val="FF0000"/>
+                    </a:solidFill>
+                  </a:rPr>
+                  <a:t> and lets us store very large networks!</a:t>
                 </a:r>
               </a:p>
               <a:p>
@@ -23715,7 +23807,7 @@
               <a:blipFill>
                 <a:blip r:embed="rId3"/>
                 <a:stretch>
-                  <a:fillRect l="-486" t="-836" r="-243"/>
+                  <a:fillRect l="-486" t="-836"/>
                 </a:stretch>
               </a:blipFill>
             </p:spPr>
@@ -23896,55 +23988,6 @@
                                     <p:set>
                                       <p:cBhvr>
                                         <p:cTn id="14" dur="1" fill="hold">
-                                          <p:stCondLst>
-                                            <p:cond delay="0"/>
-                                          </p:stCondLst>
-                                        </p:cTn>
-                                        <p:tgtEl>
-                                          <p:spTgt spid="9219">
-                                            <p:txEl>
-                                              <p:pRg st="4" end="4"/>
-                                            </p:txEl>
-                                          </p:spTgt>
-                                        </p:tgtEl>
-                                        <p:attrNameLst>
-                                          <p:attrName>style.visibility</p:attrName>
-                                        </p:attrNameLst>
-                                      </p:cBhvr>
-                                      <p:to>
-                                        <p:strVal val="visible"/>
-                                      </p:to>
-                                    </p:set>
-                                  </p:childTnLst>
-                                </p:cTn>
-                              </p:par>
-                            </p:childTnLst>
-                          </p:cTn>
-                        </p:par>
-                      </p:childTnLst>
-                    </p:cTn>
-                  </p:par>
-                  <p:par>
-                    <p:cTn id="15" fill="hold">
-                      <p:stCondLst>
-                        <p:cond delay="indefinite"/>
-                      </p:stCondLst>
-                      <p:childTnLst>
-                        <p:par>
-                          <p:cTn id="16" fill="hold">
-                            <p:stCondLst>
-                              <p:cond delay="0"/>
-                            </p:stCondLst>
-                            <p:childTnLst>
-                              <p:par>
-                                <p:cTn id="17" presetID="1" presetClass="entr" presetSubtype="0" fill="hold" nodeType="clickEffect">
-                                  <p:stCondLst>
-                                    <p:cond delay="0"/>
-                                  </p:stCondLst>
-                                  <p:childTnLst>
-                                    <p:set>
-                                      <p:cBhvr>
-                                        <p:cTn id="18" dur="1" fill="hold">
                                           <p:stCondLst>
                                             <p:cond delay="0"/>
                                           </p:stCondLst>
@@ -24433,8 +24476,8 @@
           </a:p>
         </p:txBody>
       </p:sp>
-      <mc:AlternateContent xmlns:mc="http://schemas.openxmlformats.org/markup-compatibility/2006">
-        <mc:Choice xmlns:a14="http://schemas.microsoft.com/office/drawing/2010/main" Requires="a14">
+      <mc:AlternateContent xmlns:mc="http://schemas.openxmlformats.org/markup-compatibility/2006" xmlns:a14="http://schemas.microsoft.com/office/drawing/2010/main">
+        <mc:Choice Requires="a14">
           <p:sp>
             <p:nvSpPr>
               <p:cNvPr id="30722" name="Content Placeholder 2"/>
@@ -26346,7 +26389,7 @@
             </p:txBody>
           </p:sp>
         </mc:Choice>
-        <mc:Fallback>
+        <mc:Fallback xmlns="">
           <p:sp>
             <p:nvSpPr>
               <p:cNvPr id="30722" name="Content Placeholder 2"/>
@@ -26436,8 +26479,8 @@
           </a:p>
         </p:txBody>
       </p:sp>
-      <mc:AlternateContent xmlns:mc="http://schemas.openxmlformats.org/markup-compatibility/2006">
-        <mc:Choice xmlns:a14="http://schemas.microsoft.com/office/drawing/2010/main" Requires="a14">
+      <mc:AlternateContent xmlns:mc="http://schemas.openxmlformats.org/markup-compatibility/2006" xmlns:a14="http://schemas.microsoft.com/office/drawing/2010/main">
+        <mc:Choice Requires="a14">
           <p:sp>
             <p:nvSpPr>
               <p:cNvPr id="11267" name="Rectangle 3"/>
@@ -26982,7 +27025,7 @@
             </p:txBody>
           </p:sp>
         </mc:Choice>
-        <mc:Fallback>
+        <mc:Fallback xmlns="">
           <p:sp>
             <p:nvSpPr>
               <p:cNvPr id="11267" name="Rectangle 3"/>
@@ -27712,8 +27755,8 @@
           </a:p>
         </p:txBody>
       </p:sp>
-      <mc:AlternateContent xmlns:mc="http://schemas.openxmlformats.org/markup-compatibility/2006">
-        <mc:Choice xmlns:a14="http://schemas.microsoft.com/office/drawing/2010/main" Requires="a14">
+      <mc:AlternateContent xmlns:mc="http://schemas.openxmlformats.org/markup-compatibility/2006" xmlns:a14="http://schemas.microsoft.com/office/drawing/2010/main">
+        <mc:Choice Requires="a14">
           <p:sp>
             <p:nvSpPr>
               <p:cNvPr id="5" name="TextBox 4">
@@ -28032,7 +28075,7 @@
             </p:txBody>
           </p:sp>
         </mc:Choice>
-        <mc:Fallback>
+        <mc:Fallback xmlns="">
           <p:sp>
             <p:nvSpPr>
               <p:cNvPr id="5" name="TextBox 4">
@@ -29741,8 +29784,8 @@
           </a:p>
         </p:txBody>
       </p:sp>
-      <mc:AlternateContent xmlns:mc="http://schemas.openxmlformats.org/markup-compatibility/2006">
-        <mc:Choice xmlns:a14="http://schemas.microsoft.com/office/drawing/2010/main" Requires="a14">
+      <mc:AlternateContent xmlns:mc="http://schemas.openxmlformats.org/markup-compatibility/2006" xmlns:a14="http://schemas.microsoft.com/office/drawing/2010/main">
+        <mc:Choice Requires="a14">
           <p:sp>
             <p:nvSpPr>
               <p:cNvPr id="3" name="Content Placeholder 2"/>
@@ -30536,7 +30579,7 @@
             </p:txBody>
           </p:sp>
         </mc:Choice>
-        <mc:Fallback>
+        <mc:Fallback xmlns="">
           <p:sp>
             <p:nvSpPr>
               <p:cNvPr id="3" name="Content Placeholder 2"/>
@@ -33413,8 +33456,8 @@
           </a:p>
         </p:txBody>
       </p:sp>
-      <mc:AlternateContent xmlns:mc="http://schemas.openxmlformats.org/markup-compatibility/2006">
-        <mc:Choice xmlns:a14="http://schemas.microsoft.com/office/drawing/2010/main" Requires="a14">
+      <mc:AlternateContent xmlns:mc="http://schemas.openxmlformats.org/markup-compatibility/2006" xmlns:a14="http://schemas.microsoft.com/office/drawing/2010/main">
+        <mc:Choice Requires="a14">
           <p:sp>
             <p:nvSpPr>
               <p:cNvPr id="3" name="Content Placeholder 2"/>
@@ -33565,7 +33608,7 @@
             </p:txBody>
           </p:sp>
         </mc:Choice>
-        <mc:Fallback>
+        <mc:Fallback xmlns="">
           <p:sp>
             <p:nvSpPr>
               <p:cNvPr id="3" name="Content Placeholder 2"/>
@@ -35230,6 +35273,60 @@
           </a:p>
         </p:txBody>
       </p:sp>
+      <p:sp>
+        <p:nvSpPr>
+          <p:cNvPr id="3" name="TextBox 2">
+            <a:extLst>
+              <a:ext uri="{FF2B5EF4-FFF2-40B4-BE49-F238E27FC236}">
+                <a16:creationId xmlns:a16="http://schemas.microsoft.com/office/drawing/2014/main" id="{A8E25CB5-E12C-43B2-8EA5-59C23476CC56}"/>
+              </a:ext>
+            </a:extLst>
+          </p:cNvPr>
+          <p:cNvSpPr txBox="1"/>
+          <p:nvPr/>
+        </p:nvSpPr>
+        <p:spPr>
+          <a:xfrm>
+            <a:off x="628650" y="5819783"/>
+            <a:ext cx="2146146" cy="646331"/>
+          </a:xfrm>
+          <a:prstGeom prst="rect">
+            <a:avLst/>
+          </a:prstGeom>
+        </p:spPr>
+        <p:style>
+          <a:lnRef idx="2">
+            <a:schemeClr val="accent2">
+              <a:shade val="15000"/>
+            </a:schemeClr>
+          </a:lnRef>
+          <a:fillRef idx="1">
+            <a:schemeClr val="accent2"/>
+          </a:fillRef>
+          <a:effectRef idx="0">
+            <a:schemeClr val="accent2"/>
+          </a:effectRef>
+          <a:fontRef idx="minor">
+            <a:schemeClr val="lt1"/>
+          </a:fontRef>
+        </p:style>
+        <p:txBody>
+          <a:bodyPr wrap="square" rtlCol="0">
+            <a:spAutoFit/>
+          </a:bodyPr>
+          <a:lstStyle/>
+          <a:p>
+            <a:r>
+              <a:rPr lang="en-US" b="1" dirty="0"/>
+              <a:t>Note</a:t>
+            </a:r>
+            <a:r>
+              <a:rPr lang="en-US" dirty="0"/>
+              <a:t>: This looks like playouts in games!</a:t>
+            </a:r>
+          </a:p>
+        </p:txBody>
+      </p:sp>
     </p:spTree>
     <p:extLst>
       <p:ext uri="{BB962C8B-B14F-4D97-AF65-F5344CB8AC3E}">
@@ -36412,8 +36509,8 @@
           </a:p>
         </p:txBody>
       </p:sp>
-      <mc:AlternateContent xmlns:mc="http://schemas.openxmlformats.org/markup-compatibility/2006">
-        <mc:Choice xmlns:a14="http://schemas.microsoft.com/office/drawing/2010/main" Requires="a14">
+      <mc:AlternateContent xmlns:mc="http://schemas.openxmlformats.org/markup-compatibility/2006" xmlns:a14="http://schemas.microsoft.com/office/drawing/2010/main">
+        <mc:Choice Requires="a14">
           <p:sp>
             <p:nvSpPr>
               <p:cNvPr id="3" name="Content Placeholder 2"/>
@@ -37198,7 +37295,7 @@
             </p:txBody>
           </p:sp>
         </mc:Choice>
-        <mc:Fallback>
+        <mc:Fallback xmlns="">
           <p:sp>
             <p:nvSpPr>
               <p:cNvPr id="3" name="Content Placeholder 2"/>
@@ -37436,8 +37533,8 @@
           </a:p>
         </p:txBody>
       </p:sp>
-      <mc:AlternateContent xmlns:mc="http://schemas.openxmlformats.org/markup-compatibility/2006">
-        <mc:Choice xmlns:a14="http://schemas.microsoft.com/office/drawing/2010/main" Requires="a14">
+      <mc:AlternateContent xmlns:mc="http://schemas.openxmlformats.org/markup-compatibility/2006" xmlns:a14="http://schemas.microsoft.com/office/drawing/2010/main">
+        <mc:Choice Requires="a14">
           <p:sp>
             <p:nvSpPr>
               <p:cNvPr id="3" name="Content Placeholder 2"/>
@@ -37787,7 +37884,7 @@
             </p:txBody>
           </p:sp>
         </mc:Choice>
-        <mc:Fallback>
+        <mc:Fallback xmlns="">
           <p:sp>
             <p:nvSpPr>
               <p:cNvPr id="3" name="Content Placeholder 2"/>
@@ -38503,8 +38600,8 @@
           </a:p>
         </p:txBody>
       </p:sp>
-      <mc:AlternateContent xmlns:mc="http://schemas.openxmlformats.org/markup-compatibility/2006">
-        <mc:Choice xmlns:a14="http://schemas.microsoft.com/office/drawing/2010/main" Requires="a14">
+      <mc:AlternateContent xmlns:mc="http://schemas.openxmlformats.org/markup-compatibility/2006" xmlns:a14="http://schemas.microsoft.com/office/drawing/2010/main">
+        <mc:Choice Requires="a14">
           <p:sp>
             <p:nvSpPr>
               <p:cNvPr id="3" name="Content Placeholder 2"/>
@@ -39061,7 +39158,7 @@
             </p:txBody>
           </p:sp>
         </mc:Choice>
-        <mc:Fallback>
+        <mc:Fallback xmlns="">
           <p:sp>
             <p:nvSpPr>
               <p:cNvPr id="3" name="Content Placeholder 2"/>
@@ -41031,8 +41128,8 @@
           </a:p>
         </p:txBody>
       </p:sp>
-      <mc:AlternateContent xmlns:mc="http://schemas.openxmlformats.org/markup-compatibility/2006">
-        <mc:Choice xmlns:a14="http://schemas.microsoft.com/office/drawing/2010/main" Requires="a14">
+      <mc:AlternateContent xmlns:mc="http://schemas.openxmlformats.org/markup-compatibility/2006" xmlns:a14="http://schemas.microsoft.com/office/drawing/2010/main">
+        <mc:Choice Requires="a14">
           <p:sp>
             <p:nvSpPr>
               <p:cNvPr id="3" name="Content Placeholder 2">
@@ -41559,7 +41656,7 @@
             </p:txBody>
           </p:sp>
         </mc:Choice>
-        <mc:Fallback>
+        <mc:Fallback xmlns="">
           <p:sp>
             <p:nvSpPr>
               <p:cNvPr id="3" name="Content Placeholder 2">
@@ -41932,8 +42029,8 @@
           </a:p>
         </p:txBody>
       </p:sp>
-      <mc:AlternateContent xmlns:mc="http://schemas.openxmlformats.org/markup-compatibility/2006">
-        <mc:Choice xmlns:a14="http://schemas.microsoft.com/office/drawing/2010/main" Requires="a14">
+      <mc:AlternateContent xmlns:mc="http://schemas.openxmlformats.org/markup-compatibility/2006" xmlns:a14="http://schemas.microsoft.com/office/drawing/2010/main">
+        <mc:Choice Requires="a14">
           <p:sp>
             <p:nvSpPr>
               <p:cNvPr id="3" name="Content Placeholder 2">
@@ -42272,13 +42369,7 @@
                       <a:rPr lang="en-US" sz="1700" i="1" dirty="0" smtClean="0">
                         <a:latin typeface="Cambria Math" panose="02040503050406030204" pitchFamily="18" charset="0"/>
                       </a:rPr>
-                      <m:t>𝑟</m:t>
-                    </m:r>
-                    <m:r>
-                      <a:rPr lang="en-US" sz="1700" i="1" dirty="0" smtClean="0">
-                        <a:latin typeface="Cambria Math" panose="02040503050406030204" pitchFamily="18" charset="0"/>
-                      </a:rPr>
-                      <m:t>𝑎𝑖𝑛</m:t>
+                      <m:t>𝑟𝑎𝑖𝑛</m:t>
                     </m:r>
                     <m:r>
                       <a:rPr lang="en-US" sz="1700" i="1" dirty="0" smtClean="0">
@@ -42540,7 +42631,7 @@
             </p:txBody>
           </p:sp>
         </mc:Choice>
-        <mc:Fallback>
+        <mc:Fallback xmlns="">
           <p:sp>
             <p:nvSpPr>
               <p:cNvPr id="3" name="Content Placeholder 2">
@@ -46820,8 +46911,8 @@
           </a:p>
         </p:txBody>
       </p:sp>
-      <mc:AlternateContent xmlns:mc="http://schemas.openxmlformats.org/markup-compatibility/2006">
-        <mc:Choice xmlns:a14="http://schemas.microsoft.com/office/drawing/2010/main" Requires="a14">
+      <mc:AlternateContent xmlns:mc="http://schemas.openxmlformats.org/markup-compatibility/2006" xmlns:a14="http://schemas.microsoft.com/office/drawing/2010/main">
+        <mc:Choice Requires="a14">
           <p:sp>
             <p:nvSpPr>
               <p:cNvPr id="19" name="Content Placeholder 18"/>
@@ -46950,7 +47041,7 @@
             </p:txBody>
           </p:sp>
         </mc:Choice>
-        <mc:Fallback>
+        <mc:Fallback xmlns="">
           <p:sp>
             <p:nvSpPr>
               <p:cNvPr id="19" name="Content Placeholder 18"/>
@@ -47411,8 +47502,8 @@
             </a:p>
           </p:txBody>
         </p:sp>
-        <mc:AlternateContent xmlns:mc="http://schemas.openxmlformats.org/markup-compatibility/2006">
-          <mc:Choice xmlns:a14="http://schemas.microsoft.com/office/drawing/2010/main" Requires="a14">
+        <mc:AlternateContent xmlns:mc="http://schemas.openxmlformats.org/markup-compatibility/2006" xmlns:a14="http://schemas.microsoft.com/office/drawing/2010/main">
+          <mc:Choice Requires="a14">
             <p:sp>
               <p:nvSpPr>
                 <p:cNvPr id="8" name="Oval 7"/>
@@ -47482,7 +47573,7 @@
               </p:txBody>
             </p:sp>
           </mc:Choice>
-          <mc:Fallback>
+          <mc:Fallback xmlns="">
             <p:sp>
               <p:nvSpPr>
                 <p:cNvPr id="8" name="Oval 7"/>
@@ -47649,8 +47740,8 @@
           </p:style>
         </p:cxnSp>
       </p:grpSp>
-      <mc:AlternateContent xmlns:mc="http://schemas.openxmlformats.org/markup-compatibility/2006">
-        <mc:Choice xmlns:a14="http://schemas.microsoft.com/office/drawing/2010/main" Requires="a14">
+      <mc:AlternateContent xmlns:mc="http://schemas.openxmlformats.org/markup-compatibility/2006" xmlns:a14="http://schemas.microsoft.com/office/drawing/2010/main">
+        <mc:Choice Requires="a14">
           <p:sp>
             <p:nvSpPr>
               <p:cNvPr id="11" name="TextBox 10">
@@ -47987,7 +48078,7 @@
             </p:txBody>
           </p:sp>
         </mc:Choice>
-        <mc:Fallback>
+        <mc:Fallback xmlns="">
           <p:sp>
             <p:nvSpPr>
               <p:cNvPr id="11" name="TextBox 10">

</xml_diff>